<commit_message>
Edit board-server build gradle common 참조
</commit_message>
<xml_diff>
--- a/study-note/자바/2022-08-19 내용정리.pptx
+++ b/study-note/자바/2022-08-19 내용정리.pptx
@@ -3779,6 +3779,333 @@
           <a:chExt cx="0" cy="0"/>
         </a:xfrm>
       </p:grpSpPr>
+      <p:sp>
+        <p:nvSpPr>
+          <p:cNvPr id="2" name="직사각형 1">
+            <a:extLst>
+              <a:ext uri="{FF2B5EF4-FFF2-40B4-BE49-F238E27FC236}">
+                <a16:creationId xmlns:a16="http://schemas.microsoft.com/office/drawing/2014/main" id="{DF573061-83BA-D3F8-8FB8-A64815831369}"/>
+              </a:ext>
+            </a:extLst>
+          </p:cNvPr>
+          <p:cNvSpPr/>
+          <p:nvPr/>
+        </p:nvSpPr>
+        <p:spPr>
+          <a:xfrm>
+            <a:off x="1534510" y="1996966"/>
+            <a:ext cx="1702676" cy="557048"/>
+          </a:xfrm>
+          <a:prstGeom prst="rect">
+            <a:avLst/>
+          </a:prstGeom>
+        </p:spPr>
+        <p:style>
+          <a:lnRef idx="2">
+            <a:schemeClr val="accent1">
+              <a:shade val="50000"/>
+            </a:schemeClr>
+          </a:lnRef>
+          <a:fillRef idx="1">
+            <a:schemeClr val="accent1"/>
+          </a:fillRef>
+          <a:effectRef idx="0">
+            <a:schemeClr val="accent1"/>
+          </a:effectRef>
+          <a:fontRef idx="minor">
+            <a:schemeClr val="lt1"/>
+          </a:fontRef>
+        </p:style>
+        <p:txBody>
+          <a:bodyPr rtlCol="0" anchor="ctr"/>
+          <a:lstStyle/>
+          <a:p>
+            <a:pPr algn="ctr"/>
+            <a:r>
+              <a:rPr kumimoji="1" lang="en-US" altLang="ko-Kore-KR" dirty="0"/>
+              <a:t>app</a:t>
+            </a:r>
+            <a:endParaRPr kumimoji="1" lang="ko-Kore-KR" altLang="en-US" dirty="0"/>
+          </a:p>
+        </p:txBody>
+      </p:sp>
+      <p:sp>
+        <p:nvSpPr>
+          <p:cNvPr id="3" name="직사각형 2">
+            <a:extLst>
+              <a:ext uri="{FF2B5EF4-FFF2-40B4-BE49-F238E27FC236}">
+                <a16:creationId xmlns:a16="http://schemas.microsoft.com/office/drawing/2014/main" id="{8C5FC188-7A6F-00C2-BB91-154B356C9DFB}"/>
+              </a:ext>
+            </a:extLst>
+          </p:cNvPr>
+          <p:cNvSpPr/>
+          <p:nvPr/>
+        </p:nvSpPr>
+        <p:spPr>
+          <a:xfrm>
+            <a:off x="1534510" y="3347545"/>
+            <a:ext cx="1702676" cy="557048"/>
+          </a:xfrm>
+          <a:prstGeom prst="rect">
+            <a:avLst/>
+          </a:prstGeom>
+        </p:spPr>
+        <p:style>
+          <a:lnRef idx="2">
+            <a:schemeClr val="accent1">
+              <a:shade val="50000"/>
+            </a:schemeClr>
+          </a:lnRef>
+          <a:fillRef idx="1">
+            <a:schemeClr val="accent1"/>
+          </a:fillRef>
+          <a:effectRef idx="0">
+            <a:schemeClr val="accent1"/>
+          </a:effectRef>
+          <a:fontRef idx="minor">
+            <a:schemeClr val="lt1"/>
+          </a:fontRef>
+        </p:style>
+        <p:txBody>
+          <a:bodyPr rtlCol="0" anchor="ctr"/>
+          <a:lstStyle/>
+          <a:p>
+            <a:pPr algn="ctr"/>
+            <a:r>
+              <a:rPr kumimoji="1" lang="en-US" altLang="ko-Kore-KR" dirty="0"/>
+              <a:t>utilities</a:t>
+            </a:r>
+            <a:endParaRPr kumimoji="1" lang="ko-Kore-KR" altLang="en-US" dirty="0"/>
+          </a:p>
+        </p:txBody>
+      </p:sp>
+      <p:sp>
+        <p:nvSpPr>
+          <p:cNvPr id="4" name="직사각형 3">
+            <a:extLst>
+              <a:ext uri="{FF2B5EF4-FFF2-40B4-BE49-F238E27FC236}">
+                <a16:creationId xmlns:a16="http://schemas.microsoft.com/office/drawing/2014/main" id="{EA3A4CB2-14CA-ED15-0F87-A7A3D4AFDDD6}"/>
+              </a:ext>
+            </a:extLst>
+          </p:cNvPr>
+          <p:cNvSpPr/>
+          <p:nvPr/>
+        </p:nvSpPr>
+        <p:spPr>
+          <a:xfrm>
+            <a:off x="1534510" y="4545724"/>
+            <a:ext cx="1702676" cy="557048"/>
+          </a:xfrm>
+          <a:prstGeom prst="rect">
+            <a:avLst/>
+          </a:prstGeom>
+        </p:spPr>
+        <p:style>
+          <a:lnRef idx="2">
+            <a:schemeClr val="accent1">
+              <a:shade val="50000"/>
+            </a:schemeClr>
+          </a:lnRef>
+          <a:fillRef idx="1">
+            <a:schemeClr val="accent1"/>
+          </a:fillRef>
+          <a:effectRef idx="0">
+            <a:schemeClr val="accent1"/>
+          </a:effectRef>
+          <a:fontRef idx="minor">
+            <a:schemeClr val="lt1"/>
+          </a:fontRef>
+        </p:style>
+        <p:txBody>
+          <a:bodyPr rtlCol="0" anchor="ctr"/>
+          <a:lstStyle/>
+          <a:p>
+            <a:pPr algn="ctr"/>
+            <a:r>
+              <a:rPr kumimoji="1" lang="en-US" altLang="ko-Kore-KR" dirty="0"/>
+              <a:t>library</a:t>
+            </a:r>
+            <a:endParaRPr kumimoji="1" lang="ko-Kore-KR" altLang="en-US" dirty="0"/>
+          </a:p>
+        </p:txBody>
+      </p:sp>
+      <p:cxnSp>
+        <p:nvCxnSpPr>
+          <p:cNvPr id="6" name="직선 화살표 연결선 5">
+            <a:extLst>
+              <a:ext uri="{FF2B5EF4-FFF2-40B4-BE49-F238E27FC236}">
+                <a16:creationId xmlns:a16="http://schemas.microsoft.com/office/drawing/2014/main" id="{15940AB1-573E-B4ED-8A16-86A74794EEF7}"/>
+              </a:ext>
+            </a:extLst>
+          </p:cNvPr>
+          <p:cNvCxnSpPr>
+            <a:stCxn id="2" idx="2"/>
+            <a:endCxn id="3" idx="0"/>
+          </p:cNvCxnSpPr>
+          <p:nvPr/>
+        </p:nvCxnSpPr>
+        <p:spPr>
+          <a:xfrm>
+            <a:off x="2385848" y="2554014"/>
+            <a:ext cx="0" cy="793531"/>
+          </a:xfrm>
+          <a:prstGeom prst="straightConnector1">
+            <a:avLst/>
+          </a:prstGeom>
+          <a:ln>
+            <a:tailEnd type="triangle"/>
+          </a:ln>
+        </p:spPr>
+        <p:style>
+          <a:lnRef idx="3">
+            <a:schemeClr val="accent1"/>
+          </a:lnRef>
+          <a:fillRef idx="0">
+            <a:schemeClr val="accent1"/>
+          </a:fillRef>
+          <a:effectRef idx="2">
+            <a:schemeClr val="accent1"/>
+          </a:effectRef>
+          <a:fontRef idx="minor">
+            <a:schemeClr val="tx1"/>
+          </a:fontRef>
+        </p:style>
+      </p:cxnSp>
+      <p:cxnSp>
+        <p:nvCxnSpPr>
+          <p:cNvPr id="7" name="직선 화살표 연결선 6">
+            <a:extLst>
+              <a:ext uri="{FF2B5EF4-FFF2-40B4-BE49-F238E27FC236}">
+                <a16:creationId xmlns:a16="http://schemas.microsoft.com/office/drawing/2014/main" id="{631694DC-FB4E-7B36-C26F-7626F50B8A6B}"/>
+              </a:ext>
+            </a:extLst>
+          </p:cNvPr>
+          <p:cNvCxnSpPr>
+            <a:cxnSpLocks/>
+            <a:stCxn id="3" idx="2"/>
+            <a:endCxn id="4" idx="0"/>
+          </p:cNvCxnSpPr>
+          <p:nvPr/>
+        </p:nvCxnSpPr>
+        <p:spPr>
+          <a:xfrm>
+            <a:off x="2385848" y="3904593"/>
+            <a:ext cx="0" cy="641131"/>
+          </a:xfrm>
+          <a:prstGeom prst="straightConnector1">
+            <a:avLst/>
+          </a:prstGeom>
+          <a:ln>
+            <a:tailEnd type="triangle"/>
+          </a:ln>
+        </p:spPr>
+        <p:style>
+          <a:lnRef idx="3">
+            <a:schemeClr val="accent1"/>
+          </a:lnRef>
+          <a:fillRef idx="0">
+            <a:schemeClr val="accent1"/>
+          </a:fillRef>
+          <a:effectRef idx="2">
+            <a:schemeClr val="accent1"/>
+          </a:effectRef>
+          <a:fontRef idx="minor">
+            <a:schemeClr val="tx1"/>
+          </a:fontRef>
+        </p:style>
+      </p:cxnSp>
+      <p:sp>
+        <p:nvSpPr>
+          <p:cNvPr id="10" name="다이아몬드 9">
+            <a:extLst>
+              <a:ext uri="{FF2B5EF4-FFF2-40B4-BE49-F238E27FC236}">
+                <a16:creationId xmlns:a16="http://schemas.microsoft.com/office/drawing/2014/main" id="{AC38754B-DAF0-7A67-3E0F-3B26DBAD3850}"/>
+              </a:ext>
+            </a:extLst>
+          </p:cNvPr>
+          <p:cNvSpPr/>
+          <p:nvPr/>
+        </p:nvSpPr>
+        <p:spPr>
+          <a:xfrm>
+            <a:off x="2264979" y="2569779"/>
+            <a:ext cx="241738" cy="241738"/>
+          </a:xfrm>
+          <a:prstGeom prst="diamond">
+            <a:avLst/>
+          </a:prstGeom>
+        </p:spPr>
+        <p:style>
+          <a:lnRef idx="2">
+            <a:schemeClr val="accent1">
+              <a:shade val="50000"/>
+            </a:schemeClr>
+          </a:lnRef>
+          <a:fillRef idx="1">
+            <a:schemeClr val="accent1"/>
+          </a:fillRef>
+          <a:effectRef idx="0">
+            <a:schemeClr val="accent1"/>
+          </a:effectRef>
+          <a:fontRef idx="minor">
+            <a:schemeClr val="lt1"/>
+          </a:fontRef>
+        </p:style>
+        <p:txBody>
+          <a:bodyPr rtlCol="0" anchor="ctr"/>
+          <a:lstStyle/>
+          <a:p>
+            <a:pPr algn="ctr"/>
+            <a:endParaRPr kumimoji="1" lang="ko-Kore-KR" altLang="en-US"/>
+          </a:p>
+        </p:txBody>
+      </p:sp>
+      <p:sp>
+        <p:nvSpPr>
+          <p:cNvPr id="11" name="다이아몬드 10">
+            <a:extLst>
+              <a:ext uri="{FF2B5EF4-FFF2-40B4-BE49-F238E27FC236}">
+                <a16:creationId xmlns:a16="http://schemas.microsoft.com/office/drawing/2014/main" id="{3A336CE2-05C8-7ACB-043D-C77C3390C2D8}"/>
+              </a:ext>
+            </a:extLst>
+          </p:cNvPr>
+          <p:cNvSpPr/>
+          <p:nvPr/>
+        </p:nvSpPr>
+        <p:spPr>
+          <a:xfrm>
+            <a:off x="2264979" y="3883573"/>
+            <a:ext cx="241738" cy="241738"/>
+          </a:xfrm>
+          <a:prstGeom prst="diamond">
+            <a:avLst/>
+          </a:prstGeom>
+        </p:spPr>
+        <p:style>
+          <a:lnRef idx="2">
+            <a:schemeClr val="accent1">
+              <a:shade val="50000"/>
+            </a:schemeClr>
+          </a:lnRef>
+          <a:fillRef idx="1">
+            <a:schemeClr val="accent1"/>
+          </a:fillRef>
+          <a:effectRef idx="0">
+            <a:schemeClr val="accent1"/>
+          </a:effectRef>
+          <a:fontRef idx="minor">
+            <a:schemeClr val="lt1"/>
+          </a:fontRef>
+        </p:style>
+        <p:txBody>
+          <a:bodyPr rtlCol="0" anchor="ctr"/>
+          <a:lstStyle/>
+          <a:p>
+            <a:pPr algn="ctr"/>
+            <a:endParaRPr kumimoji="1" lang="ko-Kore-KR" altLang="en-US"/>
+          </a:p>
+        </p:txBody>
+      </p:sp>
     </p:spTree>
     <p:extLst>
       <p:ext uri="{BB962C8B-B14F-4D97-AF65-F5344CB8AC3E}">
@@ -12434,7 +12761,548 @@
           <a:p>
             <a:pPr algn="ctr"/>
             <a:r>
-              <a:rPr kumimoji="1" lang="en-US" altLang="ko-Kore-KR"/>
+              <a:rPr kumimoji="1" lang="en-US" altLang="ko-Kore-KR" dirty="0"/>
+              <a:t>app-client</a:t>
+            </a:r>
+            <a:endParaRPr kumimoji="1" lang="ko-Kore-KR" altLang="en-US" dirty="0"/>
+          </a:p>
+        </p:txBody>
+      </p:sp>
+      <p:sp>
+        <p:nvSpPr>
+          <p:cNvPr id="4" name="TextBox 3">
+            <a:extLst>
+              <a:ext uri="{FF2B5EF4-FFF2-40B4-BE49-F238E27FC236}">
+                <a16:creationId xmlns:a16="http://schemas.microsoft.com/office/drawing/2014/main" id="{EB028D0D-4732-6E93-993A-266FB5AC61D8}"/>
+              </a:ext>
+            </a:extLst>
+          </p:cNvPr>
+          <p:cNvSpPr txBox="1"/>
+          <p:nvPr/>
+        </p:nvSpPr>
+        <p:spPr>
+          <a:xfrm>
+            <a:off x="2291255" y="2785241"/>
+            <a:ext cx="2154621" cy="923330"/>
+          </a:xfrm>
+          <a:prstGeom prst="rect">
+            <a:avLst/>
+          </a:prstGeom>
+        </p:spPr>
+        <p:style>
+          <a:lnRef idx="2">
+            <a:schemeClr val="accent1"/>
+          </a:lnRef>
+          <a:fillRef idx="1">
+            <a:schemeClr val="lt1"/>
+          </a:fillRef>
+          <a:effectRef idx="0">
+            <a:schemeClr val="accent1"/>
+          </a:effectRef>
+          <a:fontRef idx="minor">
+            <a:schemeClr val="dk1"/>
+          </a:fontRef>
+        </p:style>
+        <p:txBody>
+          <a:bodyPr wrap="square" rtlCol="0">
+            <a:spAutoFit/>
+          </a:bodyPr>
+          <a:lstStyle/>
+          <a:p>
+            <a:pPr marL="285750" indent="-285750">
+              <a:buFont typeface="Arial" panose="020B0604020202020204" pitchFamily="34" charset="0"/>
+              <a:buChar char="•"/>
+            </a:pPr>
+            <a:r>
+              <a:rPr kumimoji="1" lang="en-US" altLang="ko-Kore-KR" b="1" dirty="0"/>
+              <a:t>Domain </a:t>
+            </a:r>
+            <a:r>
+              <a:rPr kumimoji="1" lang="ko-KR" altLang="en-US" b="1" dirty="0"/>
+              <a:t>클래스</a:t>
+            </a:r>
+            <a:endParaRPr kumimoji="1" lang="en-US" altLang="ko-KR" b="1" dirty="0"/>
+          </a:p>
+          <a:p>
+            <a:pPr marL="285750" indent="-285750">
+              <a:buFont typeface="Arial" panose="020B0604020202020204" pitchFamily="34" charset="0"/>
+              <a:buChar char="•"/>
+            </a:pPr>
+            <a:r>
+              <a:rPr kumimoji="1" lang="en-US" altLang="ko-Kore-KR" b="1" dirty="0"/>
+              <a:t>Proxy </a:t>
+            </a:r>
+            <a:r>
+              <a:rPr kumimoji="1" lang="ko-KR" altLang="en-US" b="1" dirty="0"/>
+              <a:t>클래스</a:t>
+            </a:r>
+            <a:endParaRPr kumimoji="1" lang="en-US" altLang="ko-KR" b="1" dirty="0"/>
+          </a:p>
+          <a:p>
+            <a:pPr marL="285750" indent="-285750">
+              <a:buFont typeface="Arial" panose="020B0604020202020204" pitchFamily="34" charset="0"/>
+              <a:buChar char="•"/>
+            </a:pPr>
+            <a:r>
+              <a:rPr kumimoji="1" lang="en-US" altLang="ko-Kore-KR" dirty="0"/>
+              <a:t>…</a:t>
+            </a:r>
+          </a:p>
+        </p:txBody>
+      </p:sp>
+      <p:sp>
+        <p:nvSpPr>
+          <p:cNvPr id="5" name="TextBox 4">
+            <a:extLst>
+              <a:ext uri="{FF2B5EF4-FFF2-40B4-BE49-F238E27FC236}">
+                <a16:creationId xmlns:a16="http://schemas.microsoft.com/office/drawing/2014/main" id="{6933BC3F-479D-F375-0FF5-7D934579DC65}"/>
+              </a:ext>
+            </a:extLst>
+          </p:cNvPr>
+          <p:cNvSpPr txBox="1"/>
+          <p:nvPr/>
+        </p:nvSpPr>
+        <p:spPr>
+          <a:xfrm>
+            <a:off x="2086303" y="5218386"/>
+            <a:ext cx="2154621" cy="923330"/>
+          </a:xfrm>
+          <a:prstGeom prst="rect">
+            <a:avLst/>
+          </a:prstGeom>
+        </p:spPr>
+        <p:style>
+          <a:lnRef idx="2">
+            <a:schemeClr val="accent1"/>
+          </a:lnRef>
+          <a:fillRef idx="1">
+            <a:schemeClr val="lt1"/>
+          </a:fillRef>
+          <a:effectRef idx="0">
+            <a:schemeClr val="accent1"/>
+          </a:effectRef>
+          <a:fontRef idx="minor">
+            <a:schemeClr val="dk1"/>
+          </a:fontRef>
+        </p:style>
+        <p:txBody>
+          <a:bodyPr wrap="square" rtlCol="0">
+            <a:spAutoFit/>
+          </a:bodyPr>
+          <a:lstStyle/>
+          <a:p>
+            <a:pPr marL="285750" indent="-285750">
+              <a:buFont typeface="Arial" panose="020B0604020202020204" pitchFamily="34" charset="0"/>
+              <a:buChar char="•"/>
+            </a:pPr>
+            <a:r>
+              <a:rPr kumimoji="1" lang="en-US" altLang="ko-Kore-KR" b="1" dirty="0"/>
+              <a:t>Domain </a:t>
+            </a:r>
+            <a:r>
+              <a:rPr kumimoji="1" lang="ko-KR" altLang="en-US" b="1" dirty="0"/>
+              <a:t>클래스</a:t>
+            </a:r>
+            <a:endParaRPr kumimoji="1" lang="en-US" altLang="ko-KR" b="1" dirty="0"/>
+          </a:p>
+          <a:p>
+            <a:pPr marL="285750" indent="-285750">
+              <a:buFont typeface="Arial" panose="020B0604020202020204" pitchFamily="34" charset="0"/>
+              <a:buChar char="•"/>
+            </a:pPr>
+            <a:r>
+              <a:rPr kumimoji="1" lang="en-US" altLang="ko-Kore-KR" b="1" dirty="0"/>
+              <a:t>Proxy </a:t>
+            </a:r>
+            <a:r>
+              <a:rPr kumimoji="1" lang="ko-KR" altLang="en-US" b="1" dirty="0"/>
+              <a:t>클래스</a:t>
+            </a:r>
+            <a:endParaRPr kumimoji="1" lang="en-US" altLang="ko-KR" b="1" dirty="0"/>
+          </a:p>
+          <a:p>
+            <a:pPr marL="285750" indent="-285750">
+              <a:buFont typeface="Arial" panose="020B0604020202020204" pitchFamily="34" charset="0"/>
+              <a:buChar char="•"/>
+            </a:pPr>
+            <a:r>
+              <a:rPr kumimoji="1" lang="en-US" altLang="ko-Kore-KR" dirty="0"/>
+              <a:t>…</a:t>
+            </a:r>
+            <a:endParaRPr kumimoji="1" lang="ko-Kore-KR" altLang="en-US" dirty="0"/>
+          </a:p>
+        </p:txBody>
+      </p:sp>
+      <p:cxnSp>
+        <p:nvCxnSpPr>
+          <p:cNvPr id="7" name="직선 화살표 연결선 6">
+            <a:extLst>
+              <a:ext uri="{FF2B5EF4-FFF2-40B4-BE49-F238E27FC236}">
+                <a16:creationId xmlns:a16="http://schemas.microsoft.com/office/drawing/2014/main" id="{5F658310-22C9-3606-89DD-1AAFFD93B505}"/>
+              </a:ext>
+            </a:extLst>
+          </p:cNvPr>
+          <p:cNvCxnSpPr>
+            <a:cxnSpLocks/>
+            <a:stCxn id="4" idx="3"/>
+            <a:endCxn id="11" idx="1"/>
+          </p:cNvCxnSpPr>
+          <p:nvPr/>
+        </p:nvCxnSpPr>
+        <p:spPr>
+          <a:xfrm flipV="1">
+            <a:off x="4445876" y="2532993"/>
+            <a:ext cx="4312961" cy="713913"/>
+          </a:xfrm>
+          <a:prstGeom prst="straightConnector1">
+            <a:avLst/>
+          </a:prstGeom>
+          <a:ln>
+            <a:solidFill>
+              <a:srgbClr val="FF00A8"/>
+            </a:solidFill>
+            <a:tailEnd type="triangle"/>
+          </a:ln>
+        </p:spPr>
+        <p:style>
+          <a:lnRef idx="3">
+            <a:schemeClr val="accent1"/>
+          </a:lnRef>
+          <a:fillRef idx="0">
+            <a:schemeClr val="accent1"/>
+          </a:fillRef>
+          <a:effectRef idx="2">
+            <a:schemeClr val="accent1"/>
+          </a:effectRef>
+          <a:fontRef idx="minor">
+            <a:schemeClr val="tx1"/>
+          </a:fontRef>
+        </p:style>
+      </p:cxnSp>
+      <p:cxnSp>
+        <p:nvCxnSpPr>
+          <p:cNvPr id="9" name="직선 화살표 연결선 8">
+            <a:extLst>
+              <a:ext uri="{FF2B5EF4-FFF2-40B4-BE49-F238E27FC236}">
+                <a16:creationId xmlns:a16="http://schemas.microsoft.com/office/drawing/2014/main" id="{F06D76B9-C58F-3737-670B-F2EFBF2A21C6}"/>
+              </a:ext>
+            </a:extLst>
+          </p:cNvPr>
+          <p:cNvCxnSpPr>
+            <a:cxnSpLocks/>
+            <a:stCxn id="5" idx="3"/>
+            <a:endCxn id="11" idx="1"/>
+          </p:cNvCxnSpPr>
+          <p:nvPr/>
+        </p:nvCxnSpPr>
+        <p:spPr>
+          <a:xfrm flipV="1">
+            <a:off x="4240924" y="2532993"/>
+            <a:ext cx="4517913" cy="3147058"/>
+          </a:xfrm>
+          <a:prstGeom prst="straightConnector1">
+            <a:avLst/>
+          </a:prstGeom>
+          <a:ln>
+            <a:solidFill>
+              <a:srgbClr val="FF00A8"/>
+            </a:solidFill>
+            <a:tailEnd type="triangle"/>
+          </a:ln>
+        </p:spPr>
+        <p:style>
+          <a:lnRef idx="3">
+            <a:schemeClr val="accent1"/>
+          </a:lnRef>
+          <a:fillRef idx="0">
+            <a:schemeClr val="accent1"/>
+          </a:fillRef>
+          <a:effectRef idx="2">
+            <a:schemeClr val="accent1"/>
+          </a:effectRef>
+          <a:fontRef idx="minor">
+            <a:schemeClr val="tx1"/>
+          </a:fontRef>
+        </p:style>
+      </p:cxnSp>
+      <p:sp>
+        <p:nvSpPr>
+          <p:cNvPr id="11" name="직사각형 10">
+            <a:extLst>
+              <a:ext uri="{FF2B5EF4-FFF2-40B4-BE49-F238E27FC236}">
+                <a16:creationId xmlns:a16="http://schemas.microsoft.com/office/drawing/2014/main" id="{C533667D-FB11-05B0-9E14-005802012AA7}"/>
+              </a:ext>
+            </a:extLst>
+          </p:cNvPr>
+          <p:cNvSpPr/>
+          <p:nvPr/>
+        </p:nvSpPr>
+        <p:spPr>
+          <a:xfrm>
+            <a:off x="8758837" y="2086303"/>
+            <a:ext cx="1713187" cy="893379"/>
+          </a:xfrm>
+          <a:prstGeom prst="rect">
+            <a:avLst/>
+          </a:prstGeom>
+        </p:spPr>
+        <p:style>
+          <a:lnRef idx="2">
+            <a:schemeClr val="accent1">
+              <a:shade val="50000"/>
+            </a:schemeClr>
+          </a:lnRef>
+          <a:fillRef idx="1">
+            <a:schemeClr val="accent1"/>
+          </a:fillRef>
+          <a:effectRef idx="0">
+            <a:schemeClr val="accent1"/>
+          </a:effectRef>
+          <a:fontRef idx="minor">
+            <a:schemeClr val="lt1"/>
+          </a:fontRef>
+        </p:style>
+        <p:txBody>
+          <a:bodyPr rtlCol="0" anchor="ctr"/>
+          <a:lstStyle/>
+          <a:p>
+            <a:pPr algn="ctr"/>
+            <a:r>
+              <a:rPr kumimoji="1" lang="en-US" altLang="ko-Kore-KR" dirty="0"/>
+              <a:t>app-common</a:t>
+            </a:r>
+            <a:endParaRPr kumimoji="1" lang="ko-Kore-KR" altLang="en-US" dirty="0"/>
+          </a:p>
+        </p:txBody>
+      </p:sp>
+      <p:sp>
+        <p:nvSpPr>
+          <p:cNvPr id="6" name="TextBox 5">
+            <a:extLst>
+              <a:ext uri="{FF2B5EF4-FFF2-40B4-BE49-F238E27FC236}">
+                <a16:creationId xmlns:a16="http://schemas.microsoft.com/office/drawing/2014/main" id="{4226682C-6F6C-A97E-51F0-0A7E172F76AE}"/>
+              </a:ext>
+            </a:extLst>
+          </p:cNvPr>
+          <p:cNvSpPr txBox="1"/>
+          <p:nvPr/>
+        </p:nvSpPr>
+        <p:spPr>
+          <a:xfrm>
+            <a:off x="4821949" y="3180848"/>
+            <a:ext cx="2954940" cy="646331"/>
+          </a:xfrm>
+          <a:prstGeom prst="rect">
+            <a:avLst/>
+          </a:prstGeom>
+          <a:ln>
+            <a:solidFill>
+              <a:srgbClr val="FF00A8"/>
+            </a:solidFill>
+          </a:ln>
+        </p:spPr>
+        <p:style>
+          <a:lnRef idx="2">
+            <a:schemeClr val="accent3"/>
+          </a:lnRef>
+          <a:fillRef idx="1">
+            <a:schemeClr val="lt1"/>
+          </a:fillRef>
+          <a:effectRef idx="0">
+            <a:schemeClr val="accent3"/>
+          </a:effectRef>
+          <a:fontRef idx="minor">
+            <a:schemeClr val="dk1"/>
+          </a:fontRef>
+        </p:style>
+        <p:txBody>
+          <a:bodyPr wrap="square" rtlCol="0">
+            <a:spAutoFit/>
+          </a:bodyPr>
+          <a:lstStyle/>
+          <a:p>
+            <a:pPr algn="ctr"/>
+            <a:r>
+              <a:rPr kumimoji="1" lang="en-US" altLang="ko-Kore-KR" dirty="0"/>
+              <a:t>Server/Client</a:t>
+            </a:r>
+          </a:p>
+          <a:p>
+            <a:pPr algn="ctr"/>
+            <a:r>
+              <a:rPr kumimoji="1" lang="ko-KR" altLang="en-US" dirty="0"/>
+              <a:t>공통코드 분리</a:t>
+            </a:r>
+            <a:endParaRPr kumimoji="1" lang="ko-Kore-KR" altLang="en-US" dirty="0"/>
+          </a:p>
+        </p:txBody>
+      </p:sp>
+      <p:sp>
+        <p:nvSpPr>
+          <p:cNvPr id="12" name="TextBox 11">
+            <a:extLst>
+              <a:ext uri="{FF2B5EF4-FFF2-40B4-BE49-F238E27FC236}">
+                <a16:creationId xmlns:a16="http://schemas.microsoft.com/office/drawing/2014/main" id="{D68AED98-3B2B-A738-CB6F-384633B7A30D}"/>
+              </a:ext>
+            </a:extLst>
+          </p:cNvPr>
+          <p:cNvSpPr txBox="1"/>
+          <p:nvPr/>
+        </p:nvSpPr>
+        <p:spPr>
+          <a:xfrm>
+            <a:off x="8758837" y="3416654"/>
+            <a:ext cx="2154621" cy="646331"/>
+          </a:xfrm>
+          <a:prstGeom prst="rect">
+            <a:avLst/>
+          </a:prstGeom>
+        </p:spPr>
+        <p:style>
+          <a:lnRef idx="2">
+            <a:schemeClr val="accent1"/>
+          </a:lnRef>
+          <a:fillRef idx="1">
+            <a:schemeClr val="lt1"/>
+          </a:fillRef>
+          <a:effectRef idx="0">
+            <a:schemeClr val="accent1"/>
+          </a:effectRef>
+          <a:fontRef idx="minor">
+            <a:schemeClr val="dk1"/>
+          </a:fontRef>
+        </p:style>
+        <p:txBody>
+          <a:bodyPr wrap="square" rtlCol="0">
+            <a:spAutoFit/>
+          </a:bodyPr>
+          <a:lstStyle/>
+          <a:p>
+            <a:pPr marL="285750" indent="-285750">
+              <a:buFont typeface="Arial" panose="020B0604020202020204" pitchFamily="34" charset="0"/>
+              <a:buChar char="•"/>
+            </a:pPr>
+            <a:r>
+              <a:rPr kumimoji="1" lang="en-US" altLang="ko-Kore-KR" b="1" dirty="0"/>
+              <a:t>Domain </a:t>
+            </a:r>
+            <a:r>
+              <a:rPr kumimoji="1" lang="ko-KR" altLang="en-US" b="1" dirty="0"/>
+              <a:t>클래스</a:t>
+            </a:r>
+            <a:endParaRPr kumimoji="1" lang="en-US" altLang="ko-KR" b="1" dirty="0"/>
+          </a:p>
+          <a:p>
+            <a:pPr marL="285750" indent="-285750">
+              <a:buFont typeface="Arial" panose="020B0604020202020204" pitchFamily="34" charset="0"/>
+              <a:buChar char="•"/>
+            </a:pPr>
+            <a:r>
+              <a:rPr kumimoji="1" lang="en-US" altLang="ko-Kore-KR" b="1" dirty="0"/>
+              <a:t>Proxy </a:t>
+            </a:r>
+            <a:r>
+              <a:rPr kumimoji="1" lang="ko-KR" altLang="en-US" b="1" dirty="0"/>
+              <a:t>클래스</a:t>
+            </a:r>
+            <a:endParaRPr kumimoji="1" lang="en-US" altLang="ko-Kore-KR" dirty="0"/>
+          </a:p>
+        </p:txBody>
+      </p:sp>
+      <p:sp>
+        <p:nvSpPr>
+          <p:cNvPr id="21" name="직사각형 20">
+            <a:extLst>
+              <a:ext uri="{FF2B5EF4-FFF2-40B4-BE49-F238E27FC236}">
+                <a16:creationId xmlns:a16="http://schemas.microsoft.com/office/drawing/2014/main" id="{8D5D1C84-8517-17EA-7160-EA5F4EE83865}"/>
+              </a:ext>
+            </a:extLst>
+          </p:cNvPr>
+          <p:cNvSpPr/>
+          <p:nvPr/>
+        </p:nvSpPr>
+        <p:spPr>
+          <a:xfrm>
+            <a:off x="8778322" y="388882"/>
+            <a:ext cx="1713187" cy="893379"/>
+          </a:xfrm>
+          <a:prstGeom prst="rect">
+            <a:avLst/>
+          </a:prstGeom>
+        </p:spPr>
+        <p:style>
+          <a:lnRef idx="2">
+            <a:schemeClr val="accent1">
+              <a:shade val="50000"/>
+            </a:schemeClr>
+          </a:lnRef>
+          <a:fillRef idx="1">
+            <a:schemeClr val="accent1"/>
+          </a:fillRef>
+          <a:effectRef idx="0">
+            <a:schemeClr val="accent1"/>
+          </a:effectRef>
+          <a:fontRef idx="minor">
+            <a:schemeClr val="lt1"/>
+          </a:fontRef>
+        </p:style>
+        <p:txBody>
+          <a:bodyPr rtlCol="0" anchor="ctr"/>
+          <a:lstStyle/>
+          <a:p>
+            <a:pPr algn="ctr"/>
+            <a:r>
+              <a:rPr kumimoji="1" lang="en-US" altLang="ko-Kore-KR" dirty="0"/>
+              <a:t>app-server</a:t>
+            </a:r>
+            <a:endParaRPr kumimoji="1" lang="ko-Kore-KR" altLang="en-US" dirty="0"/>
+          </a:p>
+        </p:txBody>
+      </p:sp>
+      <p:sp>
+        <p:nvSpPr>
+          <p:cNvPr id="22" name="직사각형 21">
+            <a:extLst>
+              <a:ext uri="{FF2B5EF4-FFF2-40B4-BE49-F238E27FC236}">
+                <a16:creationId xmlns:a16="http://schemas.microsoft.com/office/drawing/2014/main" id="{F45E7F2C-6B5A-39DC-B11E-C7D409141399}"/>
+              </a:ext>
+            </a:extLst>
+          </p:cNvPr>
+          <p:cNvSpPr/>
+          <p:nvPr/>
+        </p:nvSpPr>
+        <p:spPr>
+          <a:xfrm>
+            <a:off x="8773453" y="4861034"/>
+            <a:ext cx="1713187" cy="893379"/>
+          </a:xfrm>
+          <a:prstGeom prst="rect">
+            <a:avLst/>
+          </a:prstGeom>
+        </p:spPr>
+        <p:style>
+          <a:lnRef idx="2">
+            <a:schemeClr val="accent1">
+              <a:shade val="50000"/>
+            </a:schemeClr>
+          </a:lnRef>
+          <a:fillRef idx="1">
+            <a:schemeClr val="accent1"/>
+          </a:fillRef>
+          <a:effectRef idx="0">
+            <a:schemeClr val="accent1"/>
+          </a:effectRef>
+          <a:fontRef idx="minor">
+            <a:schemeClr val="lt1"/>
+          </a:fontRef>
+        </p:style>
+        <p:txBody>
+          <a:bodyPr rtlCol="0" anchor="ctr"/>
+          <a:lstStyle/>
+          <a:p>
+            <a:pPr algn="ctr"/>
+            <a:r>
+              <a:rPr kumimoji="1" lang="en-US" altLang="ko-Kore-KR" dirty="0"/>
               <a:t>app-client</a:t>
             </a:r>
             <a:endParaRPr kumimoji="1" lang="ko-Kore-KR" altLang="en-US" dirty="0"/>

</xml_diff>

<commit_message>
Delete ServerApp class while
</commit_message>
<xml_diff>
--- a/study-note/자바/2022-08-19 내용정리.pptx
+++ b/study-note/자바/2022-08-19 내용정리.pptx
@@ -3982,13 +3982,13 @@
           </p:cNvPr>
           <p:cNvCxnSpPr>
             <a:cxnSpLocks/>
-            <a:stCxn id="3" idx="2"/>
-            <a:endCxn id="4" idx="0"/>
+            <a:stCxn id="4" idx="0"/>
+            <a:endCxn id="3" idx="2"/>
           </p:cNvCxnSpPr>
           <p:nvPr/>
         </p:nvCxnSpPr>
         <p:spPr>
-          <a:xfrm>
+          <a:xfrm flipV="1">
             <a:off x="2385848" y="3904593"/>
             <a:ext cx="0" cy="641131"/>
           </a:xfrm>
@@ -4074,7 +4074,7 @@
         </p:nvSpPr>
         <p:spPr>
           <a:xfrm>
-            <a:off x="2264979" y="3883573"/>
+            <a:off x="2264979" y="4303986"/>
             <a:ext cx="241738" cy="241738"/>
           </a:xfrm>
           <a:prstGeom prst="diamond">
@@ -4136,6 +4136,2358 @@
           <a:chExt cx="0" cy="0"/>
         </a:xfrm>
       </p:grpSpPr>
+      <p:sp>
+        <p:nvSpPr>
+          <p:cNvPr id="2" name="TextBox 1">
+            <a:extLst>
+              <a:ext uri="{FF2B5EF4-FFF2-40B4-BE49-F238E27FC236}">
+                <a16:creationId xmlns:a16="http://schemas.microsoft.com/office/drawing/2014/main" id="{13DB143C-28B1-822C-BA73-9607DD594E9E}"/>
+              </a:ext>
+            </a:extLst>
+          </p:cNvPr>
+          <p:cNvSpPr txBox="1"/>
+          <p:nvPr/>
+        </p:nvSpPr>
+        <p:spPr>
+          <a:xfrm>
+            <a:off x="281759" y="184429"/>
+            <a:ext cx="2988576" cy="369332"/>
+          </a:xfrm>
+          <a:prstGeom prst="rect">
+            <a:avLst/>
+          </a:prstGeom>
+        </p:spPr>
+        <p:style>
+          <a:lnRef idx="2">
+            <a:schemeClr val="dk1"/>
+          </a:lnRef>
+          <a:fillRef idx="1">
+            <a:schemeClr val="lt1"/>
+          </a:fillRef>
+          <a:effectRef idx="0">
+            <a:schemeClr val="dk1"/>
+          </a:effectRef>
+          <a:fontRef idx="minor">
+            <a:schemeClr val="dk1"/>
+          </a:fontRef>
+        </p:style>
+        <p:txBody>
+          <a:bodyPr wrap="square" rtlCol="0">
+            <a:spAutoFit/>
+          </a:bodyPr>
+          <a:lstStyle/>
+          <a:p>
+            <a:r>
+              <a:rPr kumimoji="1" lang="en-US" altLang="ko-Kore-KR" dirty="0"/>
+              <a:t>1.</a:t>
+            </a:r>
+            <a:r>
+              <a:rPr kumimoji="1" lang="ko-KR" altLang="en-US" dirty="0"/>
+              <a:t> </a:t>
+            </a:r>
+            <a:r>
+              <a:rPr kumimoji="1" lang="en-US" altLang="ko-KR" dirty="0"/>
+              <a:t>Stateful</a:t>
+            </a:r>
+            <a:endParaRPr kumimoji="1" lang="ko-Kore-KR" altLang="en-US" dirty="0"/>
+          </a:p>
+        </p:txBody>
+      </p:sp>
+      <p:cxnSp>
+        <p:nvCxnSpPr>
+          <p:cNvPr id="4" name="직선 연결선[R] 3">
+            <a:extLst>
+              <a:ext uri="{FF2B5EF4-FFF2-40B4-BE49-F238E27FC236}">
+                <a16:creationId xmlns:a16="http://schemas.microsoft.com/office/drawing/2014/main" id="{9E26098D-5E36-B5E4-0373-B272C17E8957}"/>
+              </a:ext>
+            </a:extLst>
+          </p:cNvPr>
+          <p:cNvCxnSpPr/>
+          <p:nvPr/>
+        </p:nvCxnSpPr>
+        <p:spPr>
+          <a:xfrm>
+            <a:off x="1114097" y="1135117"/>
+            <a:ext cx="0" cy="5722883"/>
+          </a:xfrm>
+          <a:prstGeom prst="line">
+            <a:avLst/>
+          </a:prstGeom>
+        </p:spPr>
+        <p:style>
+          <a:lnRef idx="3">
+            <a:schemeClr val="accent5"/>
+          </a:lnRef>
+          <a:fillRef idx="0">
+            <a:schemeClr val="accent5"/>
+          </a:fillRef>
+          <a:effectRef idx="2">
+            <a:schemeClr val="accent5"/>
+          </a:effectRef>
+          <a:fontRef idx="minor">
+            <a:schemeClr val="tx1"/>
+          </a:fontRef>
+        </p:style>
+      </p:cxnSp>
+      <p:cxnSp>
+        <p:nvCxnSpPr>
+          <p:cNvPr id="5" name="직선 연결선[R] 4">
+            <a:extLst>
+              <a:ext uri="{FF2B5EF4-FFF2-40B4-BE49-F238E27FC236}">
+                <a16:creationId xmlns:a16="http://schemas.microsoft.com/office/drawing/2014/main" id="{E0D4EB37-6D0B-CD2B-7DAB-FB3D1DA7746A}"/>
+              </a:ext>
+            </a:extLst>
+          </p:cNvPr>
+          <p:cNvCxnSpPr/>
+          <p:nvPr/>
+        </p:nvCxnSpPr>
+        <p:spPr>
+          <a:xfrm>
+            <a:off x="3641835" y="1135117"/>
+            <a:ext cx="0" cy="5722883"/>
+          </a:xfrm>
+          <a:prstGeom prst="line">
+            <a:avLst/>
+          </a:prstGeom>
+        </p:spPr>
+        <p:style>
+          <a:lnRef idx="3">
+            <a:schemeClr val="accent5"/>
+          </a:lnRef>
+          <a:fillRef idx="0">
+            <a:schemeClr val="accent5"/>
+          </a:fillRef>
+          <a:effectRef idx="2">
+            <a:schemeClr val="accent5"/>
+          </a:effectRef>
+          <a:fontRef idx="minor">
+            <a:schemeClr val="tx1"/>
+          </a:fontRef>
+        </p:style>
+      </p:cxnSp>
+      <p:sp>
+        <p:nvSpPr>
+          <p:cNvPr id="7" name="TextBox 6">
+            <a:extLst>
+              <a:ext uri="{FF2B5EF4-FFF2-40B4-BE49-F238E27FC236}">
+                <a16:creationId xmlns:a16="http://schemas.microsoft.com/office/drawing/2014/main" id="{2D8A36FE-6286-15DD-839A-1AD9DC6ADD41}"/>
+              </a:ext>
+            </a:extLst>
+          </p:cNvPr>
+          <p:cNvSpPr txBox="1"/>
+          <p:nvPr/>
+        </p:nvSpPr>
+        <p:spPr>
+          <a:xfrm>
+            <a:off x="738353" y="827340"/>
+            <a:ext cx="751487" cy="307777"/>
+          </a:xfrm>
+          <a:prstGeom prst="rect">
+            <a:avLst/>
+          </a:prstGeom>
+        </p:spPr>
+        <p:style>
+          <a:lnRef idx="2">
+            <a:schemeClr val="accent5"/>
+          </a:lnRef>
+          <a:fillRef idx="1">
+            <a:schemeClr val="lt1"/>
+          </a:fillRef>
+          <a:effectRef idx="0">
+            <a:schemeClr val="accent5"/>
+          </a:effectRef>
+          <a:fontRef idx="minor">
+            <a:schemeClr val="dk1"/>
+          </a:fontRef>
+        </p:style>
+        <p:txBody>
+          <a:bodyPr wrap="square" rtlCol="0">
+            <a:spAutoFit/>
+          </a:bodyPr>
+          <a:lstStyle/>
+          <a:p>
+            <a:pPr algn="ctr"/>
+            <a:r>
+              <a:rPr kumimoji="1" lang="en-US" altLang="ko-Kore-KR" sz="1400" dirty="0"/>
+              <a:t>Client</a:t>
+            </a:r>
+            <a:endParaRPr kumimoji="1" lang="ko-Kore-KR" altLang="en-US" sz="1400" dirty="0"/>
+          </a:p>
+        </p:txBody>
+      </p:sp>
+      <p:sp>
+        <p:nvSpPr>
+          <p:cNvPr id="8" name="TextBox 7">
+            <a:extLst>
+              <a:ext uri="{FF2B5EF4-FFF2-40B4-BE49-F238E27FC236}">
+                <a16:creationId xmlns:a16="http://schemas.microsoft.com/office/drawing/2014/main" id="{620EA538-CCDC-42F4-BA3A-1721440099F1}"/>
+              </a:ext>
+            </a:extLst>
+          </p:cNvPr>
+          <p:cNvSpPr txBox="1"/>
+          <p:nvPr/>
+        </p:nvSpPr>
+        <p:spPr>
+          <a:xfrm>
+            <a:off x="3270335" y="827339"/>
+            <a:ext cx="751487" cy="307777"/>
+          </a:xfrm>
+          <a:prstGeom prst="rect">
+            <a:avLst/>
+          </a:prstGeom>
+        </p:spPr>
+        <p:style>
+          <a:lnRef idx="2">
+            <a:schemeClr val="accent5"/>
+          </a:lnRef>
+          <a:fillRef idx="1">
+            <a:schemeClr val="lt1"/>
+          </a:fillRef>
+          <a:effectRef idx="0">
+            <a:schemeClr val="accent5"/>
+          </a:effectRef>
+          <a:fontRef idx="minor">
+            <a:schemeClr val="dk1"/>
+          </a:fontRef>
+        </p:style>
+        <p:txBody>
+          <a:bodyPr wrap="square" rtlCol="0">
+            <a:spAutoFit/>
+          </a:bodyPr>
+          <a:lstStyle/>
+          <a:p>
+            <a:pPr algn="ctr"/>
+            <a:r>
+              <a:rPr kumimoji="1" lang="en-US" altLang="ko-Kore-KR" sz="1400" dirty="0"/>
+              <a:t>Server</a:t>
+            </a:r>
+            <a:endParaRPr kumimoji="1" lang="ko-Kore-KR" altLang="en-US" sz="1400" dirty="0"/>
+          </a:p>
+        </p:txBody>
+      </p:sp>
+      <p:cxnSp>
+        <p:nvCxnSpPr>
+          <p:cNvPr id="10" name="직선 화살표 연결선 9">
+            <a:extLst>
+              <a:ext uri="{FF2B5EF4-FFF2-40B4-BE49-F238E27FC236}">
+                <a16:creationId xmlns:a16="http://schemas.microsoft.com/office/drawing/2014/main" id="{3B4273EE-971B-B9DC-DED8-99D524D40022}"/>
+              </a:ext>
+            </a:extLst>
+          </p:cNvPr>
+          <p:cNvCxnSpPr/>
+          <p:nvPr/>
+        </p:nvCxnSpPr>
+        <p:spPr>
+          <a:xfrm>
+            <a:off x="1114096" y="1608083"/>
+            <a:ext cx="2527739" cy="0"/>
+          </a:xfrm>
+          <a:prstGeom prst="straightConnector1">
+            <a:avLst/>
+          </a:prstGeom>
+          <a:ln>
+            <a:tailEnd type="triangle"/>
+          </a:ln>
+        </p:spPr>
+        <p:style>
+          <a:lnRef idx="3">
+            <a:schemeClr val="accent6"/>
+          </a:lnRef>
+          <a:fillRef idx="0">
+            <a:schemeClr val="accent6"/>
+          </a:fillRef>
+          <a:effectRef idx="2">
+            <a:schemeClr val="accent6"/>
+          </a:effectRef>
+          <a:fontRef idx="minor">
+            <a:schemeClr val="tx1"/>
+          </a:fontRef>
+        </p:style>
+      </p:cxnSp>
+      <p:cxnSp>
+        <p:nvCxnSpPr>
+          <p:cNvPr id="11" name="직선 화살표 연결선 10">
+            <a:extLst>
+              <a:ext uri="{FF2B5EF4-FFF2-40B4-BE49-F238E27FC236}">
+                <a16:creationId xmlns:a16="http://schemas.microsoft.com/office/drawing/2014/main" id="{F688E08B-B403-6823-BA8E-7422EF58C334}"/>
+              </a:ext>
+            </a:extLst>
+          </p:cNvPr>
+          <p:cNvCxnSpPr/>
+          <p:nvPr/>
+        </p:nvCxnSpPr>
+        <p:spPr>
+          <a:xfrm>
+            <a:off x="1114095" y="2107324"/>
+            <a:ext cx="2527739" cy="0"/>
+          </a:xfrm>
+          <a:prstGeom prst="straightConnector1">
+            <a:avLst/>
+          </a:prstGeom>
+          <a:ln>
+            <a:tailEnd type="triangle"/>
+          </a:ln>
+        </p:spPr>
+        <p:style>
+          <a:lnRef idx="3">
+            <a:schemeClr val="accent6"/>
+          </a:lnRef>
+          <a:fillRef idx="0">
+            <a:schemeClr val="accent6"/>
+          </a:fillRef>
+          <a:effectRef idx="2">
+            <a:schemeClr val="accent6"/>
+          </a:effectRef>
+          <a:fontRef idx="minor">
+            <a:schemeClr val="tx1"/>
+          </a:fontRef>
+        </p:style>
+      </p:cxnSp>
+      <p:cxnSp>
+        <p:nvCxnSpPr>
+          <p:cNvPr id="13" name="직선 화살표 연결선 12">
+            <a:extLst>
+              <a:ext uri="{FF2B5EF4-FFF2-40B4-BE49-F238E27FC236}">
+                <a16:creationId xmlns:a16="http://schemas.microsoft.com/office/drawing/2014/main" id="{87BCD4B3-C818-5463-2130-4857C1754BB8}"/>
+              </a:ext>
+            </a:extLst>
+          </p:cNvPr>
+          <p:cNvCxnSpPr/>
+          <p:nvPr/>
+        </p:nvCxnSpPr>
+        <p:spPr>
+          <a:xfrm flipH="1">
+            <a:off x="1114096" y="2774731"/>
+            <a:ext cx="2527739" cy="0"/>
+          </a:xfrm>
+          <a:prstGeom prst="straightConnector1">
+            <a:avLst/>
+          </a:prstGeom>
+          <a:ln>
+            <a:tailEnd type="triangle"/>
+          </a:ln>
+        </p:spPr>
+        <p:style>
+          <a:lnRef idx="3">
+            <a:schemeClr val="accent2"/>
+          </a:lnRef>
+          <a:fillRef idx="0">
+            <a:schemeClr val="accent2"/>
+          </a:fillRef>
+          <a:effectRef idx="2">
+            <a:schemeClr val="accent2"/>
+          </a:effectRef>
+          <a:fontRef idx="minor">
+            <a:schemeClr val="tx1"/>
+          </a:fontRef>
+        </p:style>
+      </p:cxnSp>
+      <p:cxnSp>
+        <p:nvCxnSpPr>
+          <p:cNvPr id="14" name="직선 화살표 연결선 13">
+            <a:extLst>
+              <a:ext uri="{FF2B5EF4-FFF2-40B4-BE49-F238E27FC236}">
+                <a16:creationId xmlns:a16="http://schemas.microsoft.com/office/drawing/2014/main" id="{90AF5C2C-EF54-EF35-1D80-D5DBF9251F08}"/>
+              </a:ext>
+            </a:extLst>
+          </p:cNvPr>
+          <p:cNvCxnSpPr/>
+          <p:nvPr/>
+        </p:nvCxnSpPr>
+        <p:spPr>
+          <a:xfrm flipH="1">
+            <a:off x="1114095" y="4104290"/>
+            <a:ext cx="2527739" cy="0"/>
+          </a:xfrm>
+          <a:prstGeom prst="straightConnector1">
+            <a:avLst/>
+          </a:prstGeom>
+          <a:ln>
+            <a:tailEnd type="triangle"/>
+          </a:ln>
+        </p:spPr>
+        <p:style>
+          <a:lnRef idx="3">
+            <a:schemeClr val="accent2"/>
+          </a:lnRef>
+          <a:fillRef idx="0">
+            <a:schemeClr val="accent2"/>
+          </a:fillRef>
+          <a:effectRef idx="2">
+            <a:schemeClr val="accent2"/>
+          </a:effectRef>
+          <a:fontRef idx="minor">
+            <a:schemeClr val="tx1"/>
+          </a:fontRef>
+        </p:style>
+      </p:cxnSp>
+      <p:cxnSp>
+        <p:nvCxnSpPr>
+          <p:cNvPr id="15" name="직선 화살표 연결선 14">
+            <a:extLst>
+              <a:ext uri="{FF2B5EF4-FFF2-40B4-BE49-F238E27FC236}">
+                <a16:creationId xmlns:a16="http://schemas.microsoft.com/office/drawing/2014/main" id="{2D4301FA-5AF2-4D37-3661-410C039A68CA}"/>
+              </a:ext>
+            </a:extLst>
+          </p:cNvPr>
+          <p:cNvCxnSpPr/>
+          <p:nvPr/>
+        </p:nvCxnSpPr>
+        <p:spPr>
+          <a:xfrm>
+            <a:off x="1114094" y="3450021"/>
+            <a:ext cx="2527739" cy="0"/>
+          </a:xfrm>
+          <a:prstGeom prst="straightConnector1">
+            <a:avLst/>
+          </a:prstGeom>
+          <a:ln>
+            <a:tailEnd type="triangle"/>
+          </a:ln>
+        </p:spPr>
+        <p:style>
+          <a:lnRef idx="3">
+            <a:schemeClr val="accent6"/>
+          </a:lnRef>
+          <a:fillRef idx="0">
+            <a:schemeClr val="accent6"/>
+          </a:fillRef>
+          <a:effectRef idx="2">
+            <a:schemeClr val="accent6"/>
+          </a:effectRef>
+          <a:fontRef idx="minor">
+            <a:schemeClr val="tx1"/>
+          </a:fontRef>
+        </p:style>
+      </p:cxnSp>
+      <p:cxnSp>
+        <p:nvCxnSpPr>
+          <p:cNvPr id="16" name="직선 화살표 연결선 15">
+            <a:extLst>
+              <a:ext uri="{FF2B5EF4-FFF2-40B4-BE49-F238E27FC236}">
+                <a16:creationId xmlns:a16="http://schemas.microsoft.com/office/drawing/2014/main" id="{77E26F50-42D5-0B3C-5FA4-F9C3BAA6B19B}"/>
+              </a:ext>
+            </a:extLst>
+          </p:cNvPr>
+          <p:cNvCxnSpPr/>
+          <p:nvPr/>
+        </p:nvCxnSpPr>
+        <p:spPr>
+          <a:xfrm>
+            <a:off x="1114093" y="6072352"/>
+            <a:ext cx="2527739" cy="0"/>
+          </a:xfrm>
+          <a:prstGeom prst="straightConnector1">
+            <a:avLst/>
+          </a:prstGeom>
+          <a:ln>
+            <a:tailEnd type="triangle"/>
+          </a:ln>
+        </p:spPr>
+        <p:style>
+          <a:lnRef idx="3">
+            <a:schemeClr val="accent6"/>
+          </a:lnRef>
+          <a:fillRef idx="0">
+            <a:schemeClr val="accent6"/>
+          </a:fillRef>
+          <a:effectRef idx="2">
+            <a:schemeClr val="accent6"/>
+          </a:effectRef>
+          <a:fontRef idx="minor">
+            <a:schemeClr val="tx1"/>
+          </a:fontRef>
+        </p:style>
+      </p:cxnSp>
+      <p:sp>
+        <p:nvSpPr>
+          <p:cNvPr id="17" name="TextBox 16">
+            <a:extLst>
+              <a:ext uri="{FF2B5EF4-FFF2-40B4-BE49-F238E27FC236}">
+                <a16:creationId xmlns:a16="http://schemas.microsoft.com/office/drawing/2014/main" id="{268FACD3-AD9E-7BAF-5D7A-9C07194B6A2C}"/>
+              </a:ext>
+            </a:extLst>
+          </p:cNvPr>
+          <p:cNvSpPr txBox="1"/>
+          <p:nvPr/>
+        </p:nvSpPr>
+        <p:spPr>
+          <a:xfrm>
+            <a:off x="1976757" y="1415548"/>
+            <a:ext cx="751487" cy="276999"/>
+          </a:xfrm>
+          <a:prstGeom prst="rect">
+            <a:avLst/>
+          </a:prstGeom>
+        </p:spPr>
+        <p:style>
+          <a:lnRef idx="2">
+            <a:schemeClr val="accent6"/>
+          </a:lnRef>
+          <a:fillRef idx="1">
+            <a:schemeClr val="lt1"/>
+          </a:fillRef>
+          <a:effectRef idx="0">
+            <a:schemeClr val="accent6"/>
+          </a:effectRef>
+          <a:fontRef idx="minor">
+            <a:schemeClr val="dk1"/>
+          </a:fontRef>
+        </p:style>
+        <p:txBody>
+          <a:bodyPr wrap="square" rtlCol="0">
+            <a:spAutoFit/>
+          </a:bodyPr>
+          <a:lstStyle/>
+          <a:p>
+            <a:pPr algn="ctr"/>
+            <a:r>
+              <a:rPr kumimoji="1" lang="ko-KR" altLang="en-US" sz="1200" dirty="0"/>
+              <a:t>연결</a:t>
+            </a:r>
+            <a:endParaRPr kumimoji="1" lang="ko-Kore-KR" altLang="en-US" sz="1200" dirty="0"/>
+          </a:p>
+        </p:txBody>
+      </p:sp>
+      <p:sp>
+        <p:nvSpPr>
+          <p:cNvPr id="18" name="TextBox 17">
+            <a:extLst>
+              <a:ext uri="{FF2B5EF4-FFF2-40B4-BE49-F238E27FC236}">
+                <a16:creationId xmlns:a16="http://schemas.microsoft.com/office/drawing/2014/main" id="{7058D58A-93F2-7CBE-EA67-4616AF6F5194}"/>
+              </a:ext>
+            </a:extLst>
+          </p:cNvPr>
+          <p:cNvSpPr txBox="1"/>
+          <p:nvPr/>
+        </p:nvSpPr>
+        <p:spPr>
+          <a:xfrm>
+            <a:off x="1977666" y="2623093"/>
+            <a:ext cx="751487" cy="276999"/>
+          </a:xfrm>
+          <a:prstGeom prst="rect">
+            <a:avLst/>
+          </a:prstGeom>
+        </p:spPr>
+        <p:style>
+          <a:lnRef idx="2">
+            <a:schemeClr val="accent2"/>
+          </a:lnRef>
+          <a:fillRef idx="1">
+            <a:schemeClr val="lt1"/>
+          </a:fillRef>
+          <a:effectRef idx="0">
+            <a:schemeClr val="accent2"/>
+          </a:effectRef>
+          <a:fontRef idx="minor">
+            <a:schemeClr val="dk1"/>
+          </a:fontRef>
+        </p:style>
+        <p:txBody>
+          <a:bodyPr wrap="square" rtlCol="0">
+            <a:spAutoFit/>
+          </a:bodyPr>
+          <a:lstStyle/>
+          <a:p>
+            <a:pPr algn="ctr"/>
+            <a:r>
+              <a:rPr kumimoji="1" lang="ko-KR" altLang="en-US" sz="1200" dirty="0"/>
+              <a:t>응답</a:t>
+            </a:r>
+            <a:endParaRPr kumimoji="1" lang="ko-Kore-KR" altLang="en-US" sz="1200" dirty="0"/>
+          </a:p>
+        </p:txBody>
+      </p:sp>
+      <p:sp>
+        <p:nvSpPr>
+          <p:cNvPr id="19" name="TextBox 18">
+            <a:extLst>
+              <a:ext uri="{FF2B5EF4-FFF2-40B4-BE49-F238E27FC236}">
+                <a16:creationId xmlns:a16="http://schemas.microsoft.com/office/drawing/2014/main" id="{E7E4E18D-55D6-8E8B-2BB3-050A75D73113}"/>
+              </a:ext>
+            </a:extLst>
+          </p:cNvPr>
+          <p:cNvSpPr txBox="1"/>
+          <p:nvPr/>
+        </p:nvSpPr>
+        <p:spPr>
+          <a:xfrm>
+            <a:off x="1977667" y="1960942"/>
+            <a:ext cx="751487" cy="276999"/>
+          </a:xfrm>
+          <a:prstGeom prst="rect">
+            <a:avLst/>
+          </a:prstGeom>
+        </p:spPr>
+        <p:style>
+          <a:lnRef idx="2">
+            <a:schemeClr val="accent6"/>
+          </a:lnRef>
+          <a:fillRef idx="1">
+            <a:schemeClr val="lt1"/>
+          </a:fillRef>
+          <a:effectRef idx="0">
+            <a:schemeClr val="accent6"/>
+          </a:effectRef>
+          <a:fontRef idx="minor">
+            <a:schemeClr val="dk1"/>
+          </a:fontRef>
+        </p:style>
+        <p:txBody>
+          <a:bodyPr wrap="square" rtlCol="0">
+            <a:spAutoFit/>
+          </a:bodyPr>
+          <a:lstStyle/>
+          <a:p>
+            <a:pPr algn="ctr"/>
+            <a:r>
+              <a:rPr kumimoji="1" lang="ko-KR" altLang="en-US" sz="1200" dirty="0"/>
+              <a:t>요청</a:t>
+            </a:r>
+            <a:endParaRPr kumimoji="1" lang="ko-Kore-KR" altLang="en-US" sz="1200" dirty="0"/>
+          </a:p>
+        </p:txBody>
+      </p:sp>
+      <p:sp>
+        <p:nvSpPr>
+          <p:cNvPr id="20" name="TextBox 19">
+            <a:extLst>
+              <a:ext uri="{FF2B5EF4-FFF2-40B4-BE49-F238E27FC236}">
+                <a16:creationId xmlns:a16="http://schemas.microsoft.com/office/drawing/2014/main" id="{F53EE0D5-D8CB-376F-61E5-AFFE3EA49BCF}"/>
+              </a:ext>
+            </a:extLst>
+          </p:cNvPr>
+          <p:cNvSpPr txBox="1"/>
+          <p:nvPr/>
+        </p:nvSpPr>
+        <p:spPr>
+          <a:xfrm>
+            <a:off x="1977665" y="3311521"/>
+            <a:ext cx="751487" cy="276999"/>
+          </a:xfrm>
+          <a:prstGeom prst="rect">
+            <a:avLst/>
+          </a:prstGeom>
+        </p:spPr>
+        <p:style>
+          <a:lnRef idx="2">
+            <a:schemeClr val="accent6"/>
+          </a:lnRef>
+          <a:fillRef idx="1">
+            <a:schemeClr val="lt1"/>
+          </a:fillRef>
+          <a:effectRef idx="0">
+            <a:schemeClr val="accent6"/>
+          </a:effectRef>
+          <a:fontRef idx="minor">
+            <a:schemeClr val="dk1"/>
+          </a:fontRef>
+        </p:style>
+        <p:txBody>
+          <a:bodyPr wrap="square" rtlCol="0">
+            <a:spAutoFit/>
+          </a:bodyPr>
+          <a:lstStyle/>
+          <a:p>
+            <a:pPr algn="ctr"/>
+            <a:r>
+              <a:rPr kumimoji="1" lang="ko-KR" altLang="en-US" sz="1200" dirty="0"/>
+              <a:t>요청</a:t>
+            </a:r>
+            <a:endParaRPr kumimoji="1" lang="ko-Kore-KR" altLang="en-US" sz="1200" dirty="0"/>
+          </a:p>
+        </p:txBody>
+      </p:sp>
+      <p:sp>
+        <p:nvSpPr>
+          <p:cNvPr id="21" name="TextBox 20">
+            <a:extLst>
+              <a:ext uri="{FF2B5EF4-FFF2-40B4-BE49-F238E27FC236}">
+                <a16:creationId xmlns:a16="http://schemas.microsoft.com/office/drawing/2014/main" id="{D50EAF65-8685-C23D-586F-F30B671F9ABF}"/>
+              </a:ext>
+            </a:extLst>
+          </p:cNvPr>
+          <p:cNvSpPr txBox="1"/>
+          <p:nvPr/>
+        </p:nvSpPr>
+        <p:spPr>
+          <a:xfrm>
+            <a:off x="1976756" y="4037878"/>
+            <a:ext cx="751487" cy="276999"/>
+          </a:xfrm>
+          <a:prstGeom prst="rect">
+            <a:avLst/>
+          </a:prstGeom>
+        </p:spPr>
+        <p:style>
+          <a:lnRef idx="2">
+            <a:schemeClr val="accent2"/>
+          </a:lnRef>
+          <a:fillRef idx="1">
+            <a:schemeClr val="lt1"/>
+          </a:fillRef>
+          <a:effectRef idx="0">
+            <a:schemeClr val="accent2"/>
+          </a:effectRef>
+          <a:fontRef idx="minor">
+            <a:schemeClr val="dk1"/>
+          </a:fontRef>
+        </p:style>
+        <p:txBody>
+          <a:bodyPr wrap="square" rtlCol="0">
+            <a:spAutoFit/>
+          </a:bodyPr>
+          <a:lstStyle/>
+          <a:p>
+            <a:pPr algn="ctr"/>
+            <a:r>
+              <a:rPr kumimoji="1" lang="ko-KR" altLang="en-US" sz="1200" dirty="0"/>
+              <a:t>응답</a:t>
+            </a:r>
+            <a:endParaRPr kumimoji="1" lang="ko-Kore-KR" altLang="en-US" sz="1200" dirty="0"/>
+          </a:p>
+        </p:txBody>
+      </p:sp>
+      <p:sp>
+        <p:nvSpPr>
+          <p:cNvPr id="22" name="TextBox 21">
+            <a:extLst>
+              <a:ext uri="{FF2B5EF4-FFF2-40B4-BE49-F238E27FC236}">
+                <a16:creationId xmlns:a16="http://schemas.microsoft.com/office/drawing/2014/main" id="{8563C1C7-9E03-4459-2664-F303030B6E8E}"/>
+              </a:ext>
+            </a:extLst>
+          </p:cNvPr>
+          <p:cNvSpPr txBox="1"/>
+          <p:nvPr/>
+        </p:nvSpPr>
+        <p:spPr>
+          <a:xfrm>
+            <a:off x="1976755" y="5933852"/>
+            <a:ext cx="751487" cy="461665"/>
+          </a:xfrm>
+          <a:prstGeom prst="rect">
+            <a:avLst/>
+          </a:prstGeom>
+        </p:spPr>
+        <p:style>
+          <a:lnRef idx="2">
+            <a:schemeClr val="accent6"/>
+          </a:lnRef>
+          <a:fillRef idx="1">
+            <a:schemeClr val="lt1"/>
+          </a:fillRef>
+          <a:effectRef idx="0">
+            <a:schemeClr val="accent6"/>
+          </a:effectRef>
+          <a:fontRef idx="minor">
+            <a:schemeClr val="dk1"/>
+          </a:fontRef>
+        </p:style>
+        <p:txBody>
+          <a:bodyPr wrap="square" rtlCol="0">
+            <a:spAutoFit/>
+          </a:bodyPr>
+          <a:lstStyle/>
+          <a:p>
+            <a:pPr algn="ctr"/>
+            <a:r>
+              <a:rPr kumimoji="1" lang="ko-KR" altLang="en-US" sz="1200" dirty="0"/>
+              <a:t>끊기</a:t>
+            </a:r>
+            <a:endParaRPr kumimoji="1" lang="en-US" altLang="ko-KR" sz="1200" dirty="0"/>
+          </a:p>
+          <a:p>
+            <a:pPr algn="ctr"/>
+            <a:r>
+              <a:rPr kumimoji="1" lang="en-US" altLang="ko-KR" sz="1200" dirty="0"/>
+              <a:t>(exit)</a:t>
+            </a:r>
+            <a:endParaRPr kumimoji="1" lang="ko-Kore-KR" altLang="en-US" sz="1200" dirty="0"/>
+          </a:p>
+        </p:txBody>
+      </p:sp>
+      <p:sp>
+        <p:nvSpPr>
+          <p:cNvPr id="23" name="TextBox 22">
+            <a:extLst>
+              <a:ext uri="{FF2B5EF4-FFF2-40B4-BE49-F238E27FC236}">
+                <a16:creationId xmlns:a16="http://schemas.microsoft.com/office/drawing/2014/main" id="{8C96F71B-37B0-A98B-D3B4-B536B375E979}"/>
+              </a:ext>
+            </a:extLst>
+          </p:cNvPr>
+          <p:cNvSpPr txBox="1"/>
+          <p:nvPr/>
+        </p:nvSpPr>
+        <p:spPr>
+          <a:xfrm>
+            <a:off x="1976755" y="4710727"/>
+            <a:ext cx="751487" cy="738664"/>
+          </a:xfrm>
+          <a:prstGeom prst="rect">
+            <a:avLst/>
+          </a:prstGeom>
+        </p:spPr>
+        <p:style>
+          <a:lnRef idx="2">
+            <a:schemeClr val="accent5"/>
+          </a:lnRef>
+          <a:fillRef idx="1">
+            <a:schemeClr val="lt1"/>
+          </a:fillRef>
+          <a:effectRef idx="0">
+            <a:schemeClr val="accent5"/>
+          </a:effectRef>
+          <a:fontRef idx="minor">
+            <a:schemeClr val="dk1"/>
+          </a:fontRef>
+        </p:style>
+        <p:txBody>
+          <a:bodyPr wrap="square" rtlCol="0">
+            <a:spAutoFit/>
+          </a:bodyPr>
+          <a:lstStyle/>
+          <a:p>
+            <a:pPr algn="ctr"/>
+            <a:r>
+              <a:rPr kumimoji="1" lang="en-US" altLang="ko-KR" sz="1400" dirty="0"/>
+              <a:t>.</a:t>
+            </a:r>
+          </a:p>
+          <a:p>
+            <a:pPr algn="ctr"/>
+            <a:r>
+              <a:rPr kumimoji="1" lang="en-US" altLang="ko-KR" sz="1400" dirty="0"/>
+              <a:t>.</a:t>
+            </a:r>
+          </a:p>
+          <a:p>
+            <a:pPr algn="ctr"/>
+            <a:r>
+              <a:rPr kumimoji="1" lang="en-US" altLang="ko-KR" sz="1400" dirty="0"/>
+              <a:t>.</a:t>
+            </a:r>
+            <a:endParaRPr kumimoji="1" lang="ko-Kore-KR" altLang="en-US" sz="1400" dirty="0"/>
+          </a:p>
+        </p:txBody>
+      </p:sp>
+      <p:sp>
+        <p:nvSpPr>
+          <p:cNvPr id="24" name="TextBox 23">
+            <a:extLst>
+              <a:ext uri="{FF2B5EF4-FFF2-40B4-BE49-F238E27FC236}">
+                <a16:creationId xmlns:a16="http://schemas.microsoft.com/office/drawing/2014/main" id="{17D083AE-96C1-7AB1-7571-1C0772AD8084}"/>
+              </a:ext>
+            </a:extLst>
+          </p:cNvPr>
+          <p:cNvSpPr txBox="1"/>
+          <p:nvPr/>
+        </p:nvSpPr>
+        <p:spPr>
+          <a:xfrm>
+            <a:off x="4221524" y="1483865"/>
+            <a:ext cx="1317430" cy="523220"/>
+          </a:xfrm>
+          <a:prstGeom prst="rect">
+            <a:avLst/>
+          </a:prstGeom>
+        </p:spPr>
+        <p:style>
+          <a:lnRef idx="2">
+            <a:schemeClr val="accent5"/>
+          </a:lnRef>
+          <a:fillRef idx="1">
+            <a:schemeClr val="lt1"/>
+          </a:fillRef>
+          <a:effectRef idx="0">
+            <a:schemeClr val="accent5"/>
+          </a:effectRef>
+          <a:fontRef idx="minor">
+            <a:schemeClr val="dk1"/>
+          </a:fontRef>
+        </p:style>
+        <p:txBody>
+          <a:bodyPr wrap="square" rtlCol="0">
+            <a:spAutoFit/>
+          </a:bodyPr>
+          <a:lstStyle/>
+          <a:p>
+            <a:r>
+              <a:rPr kumimoji="1" lang="ko-KR" altLang="en-US" sz="1400" dirty="0"/>
+              <a:t>일상의 예</a:t>
+            </a:r>
+            <a:r>
+              <a:rPr kumimoji="1" lang="en-US" altLang="ko-KR" sz="1400" dirty="0"/>
+              <a:t>)</a:t>
+            </a:r>
+          </a:p>
+          <a:p>
+            <a:pPr marL="285750" indent="-285750">
+              <a:buFontTx/>
+              <a:buChar char="-"/>
+            </a:pPr>
+            <a:r>
+              <a:rPr kumimoji="1" lang="ko-KR" altLang="en-US" sz="1400" dirty="0"/>
+              <a:t>은행업무</a:t>
+            </a:r>
+            <a:endParaRPr kumimoji="1" lang="en-US" altLang="ko-KR" sz="1400" dirty="0"/>
+          </a:p>
+        </p:txBody>
+      </p:sp>
+      <p:sp>
+        <p:nvSpPr>
+          <p:cNvPr id="25" name="TextBox 24">
+            <a:extLst>
+              <a:ext uri="{FF2B5EF4-FFF2-40B4-BE49-F238E27FC236}">
+                <a16:creationId xmlns:a16="http://schemas.microsoft.com/office/drawing/2014/main" id="{97165990-DB78-1959-F387-B053AC2B81A6}"/>
+              </a:ext>
+            </a:extLst>
+          </p:cNvPr>
+          <p:cNvSpPr txBox="1"/>
+          <p:nvPr/>
+        </p:nvSpPr>
+        <p:spPr>
+          <a:xfrm>
+            <a:off x="6495296" y="184429"/>
+            <a:ext cx="2988576" cy="369332"/>
+          </a:xfrm>
+          <a:prstGeom prst="rect">
+            <a:avLst/>
+          </a:prstGeom>
+        </p:spPr>
+        <p:style>
+          <a:lnRef idx="2">
+            <a:schemeClr val="dk1"/>
+          </a:lnRef>
+          <a:fillRef idx="1">
+            <a:schemeClr val="lt1"/>
+          </a:fillRef>
+          <a:effectRef idx="0">
+            <a:schemeClr val="dk1"/>
+          </a:effectRef>
+          <a:fontRef idx="minor">
+            <a:schemeClr val="dk1"/>
+          </a:fontRef>
+        </p:style>
+        <p:txBody>
+          <a:bodyPr wrap="square" rtlCol="0">
+            <a:spAutoFit/>
+          </a:bodyPr>
+          <a:lstStyle/>
+          <a:p>
+            <a:r>
+              <a:rPr kumimoji="1" lang="en-US" altLang="ko-KR" dirty="0"/>
+              <a:t>2</a:t>
+            </a:r>
+            <a:r>
+              <a:rPr kumimoji="1" lang="en-US" altLang="ko-Kore-KR" dirty="0"/>
+              <a:t>.</a:t>
+            </a:r>
+            <a:r>
+              <a:rPr kumimoji="1" lang="ko-KR" altLang="en-US" dirty="0"/>
+              <a:t> </a:t>
+            </a:r>
+            <a:r>
+              <a:rPr kumimoji="1" lang="en-US" altLang="ko-KR" dirty="0"/>
+              <a:t>Stateless</a:t>
+            </a:r>
+            <a:endParaRPr kumimoji="1" lang="ko-Kore-KR" altLang="en-US" dirty="0"/>
+          </a:p>
+        </p:txBody>
+      </p:sp>
+      <p:cxnSp>
+        <p:nvCxnSpPr>
+          <p:cNvPr id="26" name="직선 연결선[R] 25">
+            <a:extLst>
+              <a:ext uri="{FF2B5EF4-FFF2-40B4-BE49-F238E27FC236}">
+                <a16:creationId xmlns:a16="http://schemas.microsoft.com/office/drawing/2014/main" id="{5A60E29F-BFBB-9CA7-34D8-D19FA6A17C09}"/>
+              </a:ext>
+            </a:extLst>
+          </p:cNvPr>
+          <p:cNvCxnSpPr/>
+          <p:nvPr/>
+        </p:nvCxnSpPr>
+        <p:spPr>
+          <a:xfrm>
+            <a:off x="6521670" y="1135117"/>
+            <a:ext cx="0" cy="5722883"/>
+          </a:xfrm>
+          <a:prstGeom prst="line">
+            <a:avLst/>
+          </a:prstGeom>
+        </p:spPr>
+        <p:style>
+          <a:lnRef idx="3">
+            <a:schemeClr val="accent5"/>
+          </a:lnRef>
+          <a:fillRef idx="0">
+            <a:schemeClr val="accent5"/>
+          </a:fillRef>
+          <a:effectRef idx="2">
+            <a:schemeClr val="accent5"/>
+          </a:effectRef>
+          <a:fontRef idx="minor">
+            <a:schemeClr val="tx1"/>
+          </a:fontRef>
+        </p:style>
+      </p:cxnSp>
+      <p:cxnSp>
+        <p:nvCxnSpPr>
+          <p:cNvPr id="27" name="직선 연결선[R] 26">
+            <a:extLst>
+              <a:ext uri="{FF2B5EF4-FFF2-40B4-BE49-F238E27FC236}">
+                <a16:creationId xmlns:a16="http://schemas.microsoft.com/office/drawing/2014/main" id="{240B6244-0C6F-32B6-6E9D-96977A36261B}"/>
+              </a:ext>
+            </a:extLst>
+          </p:cNvPr>
+          <p:cNvCxnSpPr/>
+          <p:nvPr/>
+        </p:nvCxnSpPr>
+        <p:spPr>
+          <a:xfrm>
+            <a:off x="9049408" y="1135117"/>
+            <a:ext cx="0" cy="5722883"/>
+          </a:xfrm>
+          <a:prstGeom prst="line">
+            <a:avLst/>
+          </a:prstGeom>
+        </p:spPr>
+        <p:style>
+          <a:lnRef idx="3">
+            <a:schemeClr val="accent5"/>
+          </a:lnRef>
+          <a:fillRef idx="0">
+            <a:schemeClr val="accent5"/>
+          </a:fillRef>
+          <a:effectRef idx="2">
+            <a:schemeClr val="accent5"/>
+          </a:effectRef>
+          <a:fontRef idx="minor">
+            <a:schemeClr val="tx1"/>
+          </a:fontRef>
+        </p:style>
+      </p:cxnSp>
+      <p:sp>
+        <p:nvSpPr>
+          <p:cNvPr id="28" name="TextBox 27">
+            <a:extLst>
+              <a:ext uri="{FF2B5EF4-FFF2-40B4-BE49-F238E27FC236}">
+                <a16:creationId xmlns:a16="http://schemas.microsoft.com/office/drawing/2014/main" id="{F51A4041-65B8-BDD4-7879-58DA234B669E}"/>
+              </a:ext>
+            </a:extLst>
+          </p:cNvPr>
+          <p:cNvSpPr txBox="1"/>
+          <p:nvPr/>
+        </p:nvSpPr>
+        <p:spPr>
+          <a:xfrm>
+            <a:off x="6145926" y="827340"/>
+            <a:ext cx="751487" cy="307777"/>
+          </a:xfrm>
+          <a:prstGeom prst="rect">
+            <a:avLst/>
+          </a:prstGeom>
+        </p:spPr>
+        <p:style>
+          <a:lnRef idx="2">
+            <a:schemeClr val="accent5"/>
+          </a:lnRef>
+          <a:fillRef idx="1">
+            <a:schemeClr val="lt1"/>
+          </a:fillRef>
+          <a:effectRef idx="0">
+            <a:schemeClr val="accent5"/>
+          </a:effectRef>
+          <a:fontRef idx="minor">
+            <a:schemeClr val="dk1"/>
+          </a:fontRef>
+        </p:style>
+        <p:txBody>
+          <a:bodyPr wrap="square" rtlCol="0">
+            <a:spAutoFit/>
+          </a:bodyPr>
+          <a:lstStyle/>
+          <a:p>
+            <a:pPr algn="ctr"/>
+            <a:r>
+              <a:rPr kumimoji="1" lang="en-US" altLang="ko-Kore-KR" sz="1400" dirty="0"/>
+              <a:t>Client</a:t>
+            </a:r>
+            <a:endParaRPr kumimoji="1" lang="ko-Kore-KR" altLang="en-US" sz="1400" dirty="0"/>
+          </a:p>
+        </p:txBody>
+      </p:sp>
+      <p:sp>
+        <p:nvSpPr>
+          <p:cNvPr id="29" name="TextBox 28">
+            <a:extLst>
+              <a:ext uri="{FF2B5EF4-FFF2-40B4-BE49-F238E27FC236}">
+                <a16:creationId xmlns:a16="http://schemas.microsoft.com/office/drawing/2014/main" id="{9D5088C2-78DC-45CC-4F89-52ADAB98E51A}"/>
+              </a:ext>
+            </a:extLst>
+          </p:cNvPr>
+          <p:cNvSpPr txBox="1"/>
+          <p:nvPr/>
+        </p:nvSpPr>
+        <p:spPr>
+          <a:xfrm>
+            <a:off x="8677908" y="827339"/>
+            <a:ext cx="751487" cy="307777"/>
+          </a:xfrm>
+          <a:prstGeom prst="rect">
+            <a:avLst/>
+          </a:prstGeom>
+        </p:spPr>
+        <p:style>
+          <a:lnRef idx="2">
+            <a:schemeClr val="accent5"/>
+          </a:lnRef>
+          <a:fillRef idx="1">
+            <a:schemeClr val="lt1"/>
+          </a:fillRef>
+          <a:effectRef idx="0">
+            <a:schemeClr val="accent5"/>
+          </a:effectRef>
+          <a:fontRef idx="minor">
+            <a:schemeClr val="dk1"/>
+          </a:fontRef>
+        </p:style>
+        <p:txBody>
+          <a:bodyPr wrap="square" rtlCol="0">
+            <a:spAutoFit/>
+          </a:bodyPr>
+          <a:lstStyle/>
+          <a:p>
+            <a:pPr algn="ctr"/>
+            <a:r>
+              <a:rPr kumimoji="1" lang="en-US" altLang="ko-Kore-KR" sz="1400" dirty="0"/>
+              <a:t>Server</a:t>
+            </a:r>
+            <a:endParaRPr kumimoji="1" lang="ko-Kore-KR" altLang="en-US" sz="1400" dirty="0"/>
+          </a:p>
+        </p:txBody>
+      </p:sp>
+      <p:cxnSp>
+        <p:nvCxnSpPr>
+          <p:cNvPr id="30" name="직선 화살표 연결선 29">
+            <a:extLst>
+              <a:ext uri="{FF2B5EF4-FFF2-40B4-BE49-F238E27FC236}">
+                <a16:creationId xmlns:a16="http://schemas.microsoft.com/office/drawing/2014/main" id="{C828CE94-1DF3-2E66-6AA8-9ADB69109024}"/>
+              </a:ext>
+            </a:extLst>
+          </p:cNvPr>
+          <p:cNvCxnSpPr/>
+          <p:nvPr/>
+        </p:nvCxnSpPr>
+        <p:spPr>
+          <a:xfrm>
+            <a:off x="6521669" y="1608083"/>
+            <a:ext cx="2527739" cy="0"/>
+          </a:xfrm>
+          <a:prstGeom prst="straightConnector1">
+            <a:avLst/>
+          </a:prstGeom>
+          <a:ln>
+            <a:tailEnd type="triangle"/>
+          </a:ln>
+        </p:spPr>
+        <p:style>
+          <a:lnRef idx="3">
+            <a:schemeClr val="accent6"/>
+          </a:lnRef>
+          <a:fillRef idx="0">
+            <a:schemeClr val="accent6"/>
+          </a:fillRef>
+          <a:effectRef idx="2">
+            <a:schemeClr val="accent6"/>
+          </a:effectRef>
+          <a:fontRef idx="minor">
+            <a:schemeClr val="tx1"/>
+          </a:fontRef>
+        </p:style>
+      </p:cxnSp>
+      <p:cxnSp>
+        <p:nvCxnSpPr>
+          <p:cNvPr id="31" name="직선 화살표 연결선 30">
+            <a:extLst>
+              <a:ext uri="{FF2B5EF4-FFF2-40B4-BE49-F238E27FC236}">
+                <a16:creationId xmlns:a16="http://schemas.microsoft.com/office/drawing/2014/main" id="{0A27CB51-590E-4B69-4729-BF115E69CFB3}"/>
+              </a:ext>
+            </a:extLst>
+          </p:cNvPr>
+          <p:cNvCxnSpPr/>
+          <p:nvPr/>
+        </p:nvCxnSpPr>
+        <p:spPr>
+          <a:xfrm>
+            <a:off x="6521668" y="2107324"/>
+            <a:ext cx="2527739" cy="0"/>
+          </a:xfrm>
+          <a:prstGeom prst="straightConnector1">
+            <a:avLst/>
+          </a:prstGeom>
+          <a:ln>
+            <a:tailEnd type="triangle"/>
+          </a:ln>
+        </p:spPr>
+        <p:style>
+          <a:lnRef idx="3">
+            <a:schemeClr val="accent6"/>
+          </a:lnRef>
+          <a:fillRef idx="0">
+            <a:schemeClr val="accent6"/>
+          </a:fillRef>
+          <a:effectRef idx="2">
+            <a:schemeClr val="accent6"/>
+          </a:effectRef>
+          <a:fontRef idx="minor">
+            <a:schemeClr val="tx1"/>
+          </a:fontRef>
+        </p:style>
+      </p:cxnSp>
+      <p:cxnSp>
+        <p:nvCxnSpPr>
+          <p:cNvPr id="32" name="직선 화살표 연결선 31">
+            <a:extLst>
+              <a:ext uri="{FF2B5EF4-FFF2-40B4-BE49-F238E27FC236}">
+                <a16:creationId xmlns:a16="http://schemas.microsoft.com/office/drawing/2014/main" id="{F5F6DD55-3E50-3AB2-682B-7F86749D92AE}"/>
+              </a:ext>
+            </a:extLst>
+          </p:cNvPr>
+          <p:cNvCxnSpPr/>
+          <p:nvPr/>
+        </p:nvCxnSpPr>
+        <p:spPr>
+          <a:xfrm flipH="1">
+            <a:off x="6519850" y="2662406"/>
+            <a:ext cx="2527739" cy="0"/>
+          </a:xfrm>
+          <a:prstGeom prst="straightConnector1">
+            <a:avLst/>
+          </a:prstGeom>
+          <a:ln>
+            <a:tailEnd type="triangle"/>
+          </a:ln>
+        </p:spPr>
+        <p:style>
+          <a:lnRef idx="3">
+            <a:schemeClr val="accent2"/>
+          </a:lnRef>
+          <a:fillRef idx="0">
+            <a:schemeClr val="accent2"/>
+          </a:fillRef>
+          <a:effectRef idx="2">
+            <a:schemeClr val="accent2"/>
+          </a:effectRef>
+          <a:fontRef idx="minor">
+            <a:schemeClr val="tx1"/>
+          </a:fontRef>
+        </p:style>
+      </p:cxnSp>
+      <p:cxnSp>
+        <p:nvCxnSpPr>
+          <p:cNvPr id="34" name="직선 화살표 연결선 33">
+            <a:extLst>
+              <a:ext uri="{FF2B5EF4-FFF2-40B4-BE49-F238E27FC236}">
+                <a16:creationId xmlns:a16="http://schemas.microsoft.com/office/drawing/2014/main" id="{8CFD0C41-45C2-9E30-8D87-71D105A4D4DB}"/>
+              </a:ext>
+            </a:extLst>
+          </p:cNvPr>
+          <p:cNvCxnSpPr/>
+          <p:nvPr/>
+        </p:nvCxnSpPr>
+        <p:spPr>
+          <a:xfrm>
+            <a:off x="6518940" y="3222082"/>
+            <a:ext cx="2527739" cy="0"/>
+          </a:xfrm>
+          <a:prstGeom prst="straightConnector1">
+            <a:avLst/>
+          </a:prstGeom>
+          <a:ln>
+            <a:tailEnd type="triangle"/>
+          </a:ln>
+        </p:spPr>
+        <p:style>
+          <a:lnRef idx="3">
+            <a:schemeClr val="accent6"/>
+          </a:lnRef>
+          <a:fillRef idx="0">
+            <a:schemeClr val="accent6"/>
+          </a:fillRef>
+          <a:effectRef idx="2">
+            <a:schemeClr val="accent6"/>
+          </a:effectRef>
+          <a:fontRef idx="minor">
+            <a:schemeClr val="tx1"/>
+          </a:fontRef>
+        </p:style>
+      </p:cxnSp>
+      <p:sp>
+        <p:nvSpPr>
+          <p:cNvPr id="36" name="TextBox 35">
+            <a:extLst>
+              <a:ext uri="{FF2B5EF4-FFF2-40B4-BE49-F238E27FC236}">
+                <a16:creationId xmlns:a16="http://schemas.microsoft.com/office/drawing/2014/main" id="{012D7B45-9F19-8882-A431-EE0E9E442439}"/>
+              </a:ext>
+            </a:extLst>
+          </p:cNvPr>
+          <p:cNvSpPr txBox="1"/>
+          <p:nvPr/>
+        </p:nvSpPr>
+        <p:spPr>
+          <a:xfrm>
+            <a:off x="7384330" y="1415548"/>
+            <a:ext cx="751487" cy="276999"/>
+          </a:xfrm>
+          <a:prstGeom prst="rect">
+            <a:avLst/>
+          </a:prstGeom>
+        </p:spPr>
+        <p:style>
+          <a:lnRef idx="2">
+            <a:schemeClr val="accent6"/>
+          </a:lnRef>
+          <a:fillRef idx="1">
+            <a:schemeClr val="lt1"/>
+          </a:fillRef>
+          <a:effectRef idx="0">
+            <a:schemeClr val="accent6"/>
+          </a:effectRef>
+          <a:fontRef idx="minor">
+            <a:schemeClr val="dk1"/>
+          </a:fontRef>
+        </p:style>
+        <p:txBody>
+          <a:bodyPr wrap="square" rtlCol="0">
+            <a:spAutoFit/>
+          </a:bodyPr>
+          <a:lstStyle/>
+          <a:p>
+            <a:pPr algn="ctr"/>
+            <a:r>
+              <a:rPr kumimoji="1" lang="ko-KR" altLang="en-US" sz="1200" dirty="0"/>
+              <a:t>연결</a:t>
+            </a:r>
+            <a:endParaRPr kumimoji="1" lang="ko-Kore-KR" altLang="en-US" sz="1200" dirty="0"/>
+          </a:p>
+        </p:txBody>
+      </p:sp>
+      <p:sp>
+        <p:nvSpPr>
+          <p:cNvPr id="37" name="TextBox 36">
+            <a:extLst>
+              <a:ext uri="{FF2B5EF4-FFF2-40B4-BE49-F238E27FC236}">
+                <a16:creationId xmlns:a16="http://schemas.microsoft.com/office/drawing/2014/main" id="{C2649B4A-887B-019F-6640-4AC57C6703F0}"/>
+              </a:ext>
+            </a:extLst>
+          </p:cNvPr>
+          <p:cNvSpPr txBox="1"/>
+          <p:nvPr/>
+        </p:nvSpPr>
+        <p:spPr>
+          <a:xfrm>
+            <a:off x="7383420" y="2510768"/>
+            <a:ext cx="751487" cy="276999"/>
+          </a:xfrm>
+          <a:prstGeom prst="rect">
+            <a:avLst/>
+          </a:prstGeom>
+        </p:spPr>
+        <p:style>
+          <a:lnRef idx="2">
+            <a:schemeClr val="accent2"/>
+          </a:lnRef>
+          <a:fillRef idx="1">
+            <a:schemeClr val="lt1"/>
+          </a:fillRef>
+          <a:effectRef idx="0">
+            <a:schemeClr val="accent2"/>
+          </a:effectRef>
+          <a:fontRef idx="minor">
+            <a:schemeClr val="dk1"/>
+          </a:fontRef>
+        </p:style>
+        <p:txBody>
+          <a:bodyPr wrap="square" rtlCol="0">
+            <a:spAutoFit/>
+          </a:bodyPr>
+          <a:lstStyle/>
+          <a:p>
+            <a:pPr algn="ctr"/>
+            <a:r>
+              <a:rPr kumimoji="1" lang="ko-KR" altLang="en-US" sz="1200" dirty="0"/>
+              <a:t>응답</a:t>
+            </a:r>
+            <a:endParaRPr kumimoji="1" lang="ko-Kore-KR" altLang="en-US" sz="1200" dirty="0"/>
+          </a:p>
+        </p:txBody>
+      </p:sp>
+      <p:sp>
+        <p:nvSpPr>
+          <p:cNvPr id="38" name="TextBox 37">
+            <a:extLst>
+              <a:ext uri="{FF2B5EF4-FFF2-40B4-BE49-F238E27FC236}">
+                <a16:creationId xmlns:a16="http://schemas.microsoft.com/office/drawing/2014/main" id="{CC5A687B-8055-9E03-4046-7B05F5B21F4A}"/>
+              </a:ext>
+            </a:extLst>
+          </p:cNvPr>
+          <p:cNvSpPr txBox="1"/>
+          <p:nvPr/>
+        </p:nvSpPr>
+        <p:spPr>
+          <a:xfrm>
+            <a:off x="7385240" y="1960942"/>
+            <a:ext cx="751487" cy="276999"/>
+          </a:xfrm>
+          <a:prstGeom prst="rect">
+            <a:avLst/>
+          </a:prstGeom>
+        </p:spPr>
+        <p:style>
+          <a:lnRef idx="2">
+            <a:schemeClr val="accent6"/>
+          </a:lnRef>
+          <a:fillRef idx="1">
+            <a:schemeClr val="lt1"/>
+          </a:fillRef>
+          <a:effectRef idx="0">
+            <a:schemeClr val="accent6"/>
+          </a:effectRef>
+          <a:fontRef idx="minor">
+            <a:schemeClr val="dk1"/>
+          </a:fontRef>
+        </p:style>
+        <p:txBody>
+          <a:bodyPr wrap="square" rtlCol="0">
+            <a:spAutoFit/>
+          </a:bodyPr>
+          <a:lstStyle/>
+          <a:p>
+            <a:pPr algn="ctr"/>
+            <a:r>
+              <a:rPr kumimoji="1" lang="ko-KR" altLang="en-US" sz="1200" dirty="0"/>
+              <a:t>요청</a:t>
+            </a:r>
+            <a:endParaRPr kumimoji="1" lang="ko-Kore-KR" altLang="en-US" sz="1200" dirty="0"/>
+          </a:p>
+        </p:txBody>
+      </p:sp>
+      <p:sp>
+        <p:nvSpPr>
+          <p:cNvPr id="39" name="TextBox 38">
+            <a:extLst>
+              <a:ext uri="{FF2B5EF4-FFF2-40B4-BE49-F238E27FC236}">
+                <a16:creationId xmlns:a16="http://schemas.microsoft.com/office/drawing/2014/main" id="{41736ACE-F93D-B4DB-363E-C4E5835495C6}"/>
+              </a:ext>
+            </a:extLst>
+          </p:cNvPr>
+          <p:cNvSpPr txBox="1"/>
+          <p:nvPr/>
+        </p:nvSpPr>
+        <p:spPr>
+          <a:xfrm>
+            <a:off x="7382511" y="3083582"/>
+            <a:ext cx="751487" cy="276999"/>
+          </a:xfrm>
+          <a:prstGeom prst="rect">
+            <a:avLst/>
+          </a:prstGeom>
+        </p:spPr>
+        <p:style>
+          <a:lnRef idx="2">
+            <a:schemeClr val="accent6"/>
+          </a:lnRef>
+          <a:fillRef idx="1">
+            <a:schemeClr val="lt1"/>
+          </a:fillRef>
+          <a:effectRef idx="0">
+            <a:schemeClr val="accent6"/>
+          </a:effectRef>
+          <a:fontRef idx="minor">
+            <a:schemeClr val="dk1"/>
+          </a:fontRef>
+        </p:style>
+        <p:txBody>
+          <a:bodyPr wrap="square" rtlCol="0">
+            <a:spAutoFit/>
+          </a:bodyPr>
+          <a:lstStyle/>
+          <a:p>
+            <a:pPr algn="ctr"/>
+            <a:r>
+              <a:rPr kumimoji="1" lang="ko-Kore-KR" altLang="en-US" sz="1200" dirty="0"/>
+              <a:t>끊기</a:t>
+            </a:r>
+          </a:p>
+        </p:txBody>
+      </p:sp>
+      <p:sp>
+        <p:nvSpPr>
+          <p:cNvPr id="43" name="TextBox 42">
+            <a:extLst>
+              <a:ext uri="{FF2B5EF4-FFF2-40B4-BE49-F238E27FC236}">
+                <a16:creationId xmlns:a16="http://schemas.microsoft.com/office/drawing/2014/main" id="{DD0C67DC-2AE3-F0EB-0C88-D61429030B45}"/>
+              </a:ext>
+            </a:extLst>
+          </p:cNvPr>
+          <p:cNvSpPr txBox="1"/>
+          <p:nvPr/>
+        </p:nvSpPr>
+        <p:spPr>
+          <a:xfrm>
+            <a:off x="9629096" y="1483865"/>
+            <a:ext cx="2100446" cy="738664"/>
+          </a:xfrm>
+          <a:prstGeom prst="rect">
+            <a:avLst/>
+          </a:prstGeom>
+        </p:spPr>
+        <p:style>
+          <a:lnRef idx="2">
+            <a:schemeClr val="accent5"/>
+          </a:lnRef>
+          <a:fillRef idx="1">
+            <a:schemeClr val="lt1"/>
+          </a:fillRef>
+          <a:effectRef idx="0">
+            <a:schemeClr val="accent5"/>
+          </a:effectRef>
+          <a:fontRef idx="minor">
+            <a:schemeClr val="dk1"/>
+          </a:fontRef>
+        </p:style>
+        <p:txBody>
+          <a:bodyPr wrap="square" rtlCol="0">
+            <a:spAutoFit/>
+          </a:bodyPr>
+          <a:lstStyle/>
+          <a:p>
+            <a:r>
+              <a:rPr kumimoji="1" lang="ko-KR" altLang="en-US" sz="1400" dirty="0"/>
+              <a:t>일상의 예</a:t>
+            </a:r>
+            <a:r>
+              <a:rPr kumimoji="1" lang="en-US" altLang="ko-KR" sz="1400" dirty="0"/>
+              <a:t>)</a:t>
+            </a:r>
+          </a:p>
+          <a:p>
+            <a:pPr marL="285750" indent="-285750">
+              <a:buFontTx/>
+              <a:buChar char="-"/>
+            </a:pPr>
+            <a:r>
+              <a:rPr kumimoji="1" lang="en-US" altLang="ko-KR" sz="1400" dirty="0"/>
+              <a:t>ARS</a:t>
+            </a:r>
+            <a:r>
+              <a:rPr kumimoji="1" lang="ko-KR" altLang="en-US" sz="1400" dirty="0"/>
+              <a:t> 인증</a:t>
+            </a:r>
+            <a:endParaRPr kumimoji="1" lang="en-US" altLang="ko-KR" sz="1400" dirty="0"/>
+          </a:p>
+          <a:p>
+            <a:pPr marL="285750" indent="-285750">
+              <a:buFontTx/>
+              <a:buChar char="-"/>
+            </a:pPr>
+            <a:r>
+              <a:rPr kumimoji="1" lang="en-US" altLang="ko-KR" sz="1400" dirty="0"/>
+              <a:t>114</a:t>
+            </a:r>
+            <a:r>
+              <a:rPr kumimoji="1" lang="ko-KR" altLang="en-US" sz="1400" dirty="0"/>
+              <a:t> 전화번호 안내</a:t>
+            </a:r>
+            <a:endParaRPr kumimoji="1" lang="en-US" altLang="ko-KR" sz="1400" dirty="0"/>
+          </a:p>
+        </p:txBody>
+      </p:sp>
+      <p:cxnSp>
+        <p:nvCxnSpPr>
+          <p:cNvPr id="44" name="직선 화살표 연결선 43">
+            <a:extLst>
+              <a:ext uri="{FF2B5EF4-FFF2-40B4-BE49-F238E27FC236}">
+                <a16:creationId xmlns:a16="http://schemas.microsoft.com/office/drawing/2014/main" id="{EB423A17-11F5-768E-CB6F-D173E52F7B5B}"/>
+              </a:ext>
+            </a:extLst>
+          </p:cNvPr>
+          <p:cNvCxnSpPr/>
+          <p:nvPr/>
+        </p:nvCxnSpPr>
+        <p:spPr>
+          <a:xfrm>
+            <a:off x="6521669" y="3947397"/>
+            <a:ext cx="2527739" cy="0"/>
+          </a:xfrm>
+          <a:prstGeom prst="straightConnector1">
+            <a:avLst/>
+          </a:prstGeom>
+          <a:ln>
+            <a:tailEnd type="triangle"/>
+          </a:ln>
+        </p:spPr>
+        <p:style>
+          <a:lnRef idx="3">
+            <a:schemeClr val="accent6"/>
+          </a:lnRef>
+          <a:fillRef idx="0">
+            <a:schemeClr val="accent6"/>
+          </a:fillRef>
+          <a:effectRef idx="2">
+            <a:schemeClr val="accent6"/>
+          </a:effectRef>
+          <a:fontRef idx="minor">
+            <a:schemeClr val="tx1"/>
+          </a:fontRef>
+        </p:style>
+      </p:cxnSp>
+      <p:cxnSp>
+        <p:nvCxnSpPr>
+          <p:cNvPr id="45" name="직선 화살표 연결선 44">
+            <a:extLst>
+              <a:ext uri="{FF2B5EF4-FFF2-40B4-BE49-F238E27FC236}">
+                <a16:creationId xmlns:a16="http://schemas.microsoft.com/office/drawing/2014/main" id="{DCCB0712-764F-E80E-7BF5-A7E686BE546B}"/>
+              </a:ext>
+            </a:extLst>
+          </p:cNvPr>
+          <p:cNvCxnSpPr/>
+          <p:nvPr/>
+        </p:nvCxnSpPr>
+        <p:spPr>
+          <a:xfrm>
+            <a:off x="6521668" y="4446638"/>
+            <a:ext cx="2527739" cy="0"/>
+          </a:xfrm>
+          <a:prstGeom prst="straightConnector1">
+            <a:avLst/>
+          </a:prstGeom>
+          <a:ln>
+            <a:tailEnd type="triangle"/>
+          </a:ln>
+        </p:spPr>
+        <p:style>
+          <a:lnRef idx="3">
+            <a:schemeClr val="accent6"/>
+          </a:lnRef>
+          <a:fillRef idx="0">
+            <a:schemeClr val="accent6"/>
+          </a:fillRef>
+          <a:effectRef idx="2">
+            <a:schemeClr val="accent6"/>
+          </a:effectRef>
+          <a:fontRef idx="minor">
+            <a:schemeClr val="tx1"/>
+          </a:fontRef>
+        </p:style>
+      </p:cxnSp>
+      <p:cxnSp>
+        <p:nvCxnSpPr>
+          <p:cNvPr id="46" name="직선 화살표 연결선 45">
+            <a:extLst>
+              <a:ext uri="{FF2B5EF4-FFF2-40B4-BE49-F238E27FC236}">
+                <a16:creationId xmlns:a16="http://schemas.microsoft.com/office/drawing/2014/main" id="{45E31BEF-DF62-8190-73B2-40E738EBCB7B}"/>
+              </a:ext>
+            </a:extLst>
+          </p:cNvPr>
+          <p:cNvCxnSpPr/>
+          <p:nvPr/>
+        </p:nvCxnSpPr>
+        <p:spPr>
+          <a:xfrm flipH="1">
+            <a:off x="6519850" y="5001720"/>
+            <a:ext cx="2527739" cy="0"/>
+          </a:xfrm>
+          <a:prstGeom prst="straightConnector1">
+            <a:avLst/>
+          </a:prstGeom>
+          <a:ln>
+            <a:tailEnd type="triangle"/>
+          </a:ln>
+        </p:spPr>
+        <p:style>
+          <a:lnRef idx="3">
+            <a:schemeClr val="accent2"/>
+          </a:lnRef>
+          <a:fillRef idx="0">
+            <a:schemeClr val="accent2"/>
+          </a:fillRef>
+          <a:effectRef idx="2">
+            <a:schemeClr val="accent2"/>
+          </a:effectRef>
+          <a:fontRef idx="minor">
+            <a:schemeClr val="tx1"/>
+          </a:fontRef>
+        </p:style>
+      </p:cxnSp>
+      <p:cxnSp>
+        <p:nvCxnSpPr>
+          <p:cNvPr id="47" name="직선 화살표 연결선 46">
+            <a:extLst>
+              <a:ext uri="{FF2B5EF4-FFF2-40B4-BE49-F238E27FC236}">
+                <a16:creationId xmlns:a16="http://schemas.microsoft.com/office/drawing/2014/main" id="{53B62EA4-31B9-978E-703D-47307AA026B2}"/>
+              </a:ext>
+            </a:extLst>
+          </p:cNvPr>
+          <p:cNvCxnSpPr/>
+          <p:nvPr/>
+        </p:nvCxnSpPr>
+        <p:spPr>
+          <a:xfrm>
+            <a:off x="6518940" y="5561396"/>
+            <a:ext cx="2527739" cy="0"/>
+          </a:xfrm>
+          <a:prstGeom prst="straightConnector1">
+            <a:avLst/>
+          </a:prstGeom>
+          <a:ln>
+            <a:tailEnd type="triangle"/>
+          </a:ln>
+        </p:spPr>
+        <p:style>
+          <a:lnRef idx="3">
+            <a:schemeClr val="accent6"/>
+          </a:lnRef>
+          <a:fillRef idx="0">
+            <a:schemeClr val="accent6"/>
+          </a:fillRef>
+          <a:effectRef idx="2">
+            <a:schemeClr val="accent6"/>
+          </a:effectRef>
+          <a:fontRef idx="minor">
+            <a:schemeClr val="tx1"/>
+          </a:fontRef>
+        </p:style>
+      </p:cxnSp>
+      <p:sp>
+        <p:nvSpPr>
+          <p:cNvPr id="48" name="TextBox 47">
+            <a:extLst>
+              <a:ext uri="{FF2B5EF4-FFF2-40B4-BE49-F238E27FC236}">
+                <a16:creationId xmlns:a16="http://schemas.microsoft.com/office/drawing/2014/main" id="{E88E023A-43D6-948D-9968-4114FDB0AAAC}"/>
+              </a:ext>
+            </a:extLst>
+          </p:cNvPr>
+          <p:cNvSpPr txBox="1"/>
+          <p:nvPr/>
+        </p:nvSpPr>
+        <p:spPr>
+          <a:xfrm>
+            <a:off x="7384330" y="3754862"/>
+            <a:ext cx="751487" cy="276999"/>
+          </a:xfrm>
+          <a:prstGeom prst="rect">
+            <a:avLst/>
+          </a:prstGeom>
+        </p:spPr>
+        <p:style>
+          <a:lnRef idx="2">
+            <a:schemeClr val="accent6"/>
+          </a:lnRef>
+          <a:fillRef idx="1">
+            <a:schemeClr val="lt1"/>
+          </a:fillRef>
+          <a:effectRef idx="0">
+            <a:schemeClr val="accent6"/>
+          </a:effectRef>
+          <a:fontRef idx="minor">
+            <a:schemeClr val="dk1"/>
+          </a:fontRef>
+        </p:style>
+        <p:txBody>
+          <a:bodyPr wrap="square" rtlCol="0">
+            <a:spAutoFit/>
+          </a:bodyPr>
+          <a:lstStyle/>
+          <a:p>
+            <a:pPr algn="ctr"/>
+            <a:r>
+              <a:rPr kumimoji="1" lang="ko-KR" altLang="en-US" sz="1200" dirty="0"/>
+              <a:t>연결</a:t>
+            </a:r>
+            <a:endParaRPr kumimoji="1" lang="ko-Kore-KR" altLang="en-US" sz="1200" dirty="0"/>
+          </a:p>
+        </p:txBody>
+      </p:sp>
+      <p:sp>
+        <p:nvSpPr>
+          <p:cNvPr id="49" name="TextBox 48">
+            <a:extLst>
+              <a:ext uri="{FF2B5EF4-FFF2-40B4-BE49-F238E27FC236}">
+                <a16:creationId xmlns:a16="http://schemas.microsoft.com/office/drawing/2014/main" id="{CA01E6EC-307A-A4C3-3E41-AB39A97A54D0}"/>
+              </a:ext>
+            </a:extLst>
+          </p:cNvPr>
+          <p:cNvSpPr txBox="1"/>
+          <p:nvPr/>
+        </p:nvSpPr>
+        <p:spPr>
+          <a:xfrm>
+            <a:off x="7383420" y="4850082"/>
+            <a:ext cx="751487" cy="276999"/>
+          </a:xfrm>
+          <a:prstGeom prst="rect">
+            <a:avLst/>
+          </a:prstGeom>
+        </p:spPr>
+        <p:style>
+          <a:lnRef idx="2">
+            <a:schemeClr val="accent2"/>
+          </a:lnRef>
+          <a:fillRef idx="1">
+            <a:schemeClr val="lt1"/>
+          </a:fillRef>
+          <a:effectRef idx="0">
+            <a:schemeClr val="accent2"/>
+          </a:effectRef>
+          <a:fontRef idx="minor">
+            <a:schemeClr val="dk1"/>
+          </a:fontRef>
+        </p:style>
+        <p:txBody>
+          <a:bodyPr wrap="square" rtlCol="0">
+            <a:spAutoFit/>
+          </a:bodyPr>
+          <a:lstStyle/>
+          <a:p>
+            <a:pPr algn="ctr"/>
+            <a:r>
+              <a:rPr kumimoji="1" lang="ko-KR" altLang="en-US" sz="1200" dirty="0"/>
+              <a:t>응답</a:t>
+            </a:r>
+            <a:endParaRPr kumimoji="1" lang="ko-Kore-KR" altLang="en-US" sz="1200" dirty="0"/>
+          </a:p>
+        </p:txBody>
+      </p:sp>
+      <p:sp>
+        <p:nvSpPr>
+          <p:cNvPr id="50" name="TextBox 49">
+            <a:extLst>
+              <a:ext uri="{FF2B5EF4-FFF2-40B4-BE49-F238E27FC236}">
+                <a16:creationId xmlns:a16="http://schemas.microsoft.com/office/drawing/2014/main" id="{8622C543-7953-B749-5F3E-128DDFA5A908}"/>
+              </a:ext>
+            </a:extLst>
+          </p:cNvPr>
+          <p:cNvSpPr txBox="1"/>
+          <p:nvPr/>
+        </p:nvSpPr>
+        <p:spPr>
+          <a:xfrm>
+            <a:off x="7385240" y="4300256"/>
+            <a:ext cx="751487" cy="276999"/>
+          </a:xfrm>
+          <a:prstGeom prst="rect">
+            <a:avLst/>
+          </a:prstGeom>
+        </p:spPr>
+        <p:style>
+          <a:lnRef idx="2">
+            <a:schemeClr val="accent6"/>
+          </a:lnRef>
+          <a:fillRef idx="1">
+            <a:schemeClr val="lt1"/>
+          </a:fillRef>
+          <a:effectRef idx="0">
+            <a:schemeClr val="accent6"/>
+          </a:effectRef>
+          <a:fontRef idx="minor">
+            <a:schemeClr val="dk1"/>
+          </a:fontRef>
+        </p:style>
+        <p:txBody>
+          <a:bodyPr wrap="square" rtlCol="0">
+            <a:spAutoFit/>
+          </a:bodyPr>
+          <a:lstStyle/>
+          <a:p>
+            <a:pPr algn="ctr"/>
+            <a:r>
+              <a:rPr kumimoji="1" lang="ko-KR" altLang="en-US" sz="1200" dirty="0"/>
+              <a:t>요청</a:t>
+            </a:r>
+            <a:endParaRPr kumimoji="1" lang="ko-Kore-KR" altLang="en-US" sz="1200" dirty="0"/>
+          </a:p>
+        </p:txBody>
+      </p:sp>
+      <p:sp>
+        <p:nvSpPr>
+          <p:cNvPr id="51" name="TextBox 50">
+            <a:extLst>
+              <a:ext uri="{FF2B5EF4-FFF2-40B4-BE49-F238E27FC236}">
+                <a16:creationId xmlns:a16="http://schemas.microsoft.com/office/drawing/2014/main" id="{9BA387D4-5F11-2718-0E15-643C4210B13F}"/>
+              </a:ext>
+            </a:extLst>
+          </p:cNvPr>
+          <p:cNvSpPr txBox="1"/>
+          <p:nvPr/>
+        </p:nvSpPr>
+        <p:spPr>
+          <a:xfrm>
+            <a:off x="7382511" y="5422896"/>
+            <a:ext cx="751487" cy="276999"/>
+          </a:xfrm>
+          <a:prstGeom prst="rect">
+            <a:avLst/>
+          </a:prstGeom>
+        </p:spPr>
+        <p:style>
+          <a:lnRef idx="2">
+            <a:schemeClr val="accent6"/>
+          </a:lnRef>
+          <a:fillRef idx="1">
+            <a:schemeClr val="lt1"/>
+          </a:fillRef>
+          <a:effectRef idx="0">
+            <a:schemeClr val="accent6"/>
+          </a:effectRef>
+          <a:fontRef idx="minor">
+            <a:schemeClr val="dk1"/>
+          </a:fontRef>
+        </p:style>
+        <p:txBody>
+          <a:bodyPr wrap="square" rtlCol="0">
+            <a:spAutoFit/>
+          </a:bodyPr>
+          <a:lstStyle/>
+          <a:p>
+            <a:pPr algn="ctr"/>
+            <a:r>
+              <a:rPr kumimoji="1" lang="ko-Kore-KR" altLang="en-US" sz="1200" dirty="0"/>
+              <a:t>끊기</a:t>
+            </a:r>
+          </a:p>
+        </p:txBody>
+      </p:sp>
+      <p:cxnSp>
+        <p:nvCxnSpPr>
+          <p:cNvPr id="53" name="직선 연결선[R] 52">
+            <a:extLst>
+              <a:ext uri="{FF2B5EF4-FFF2-40B4-BE49-F238E27FC236}">
+                <a16:creationId xmlns:a16="http://schemas.microsoft.com/office/drawing/2014/main" id="{FD769593-47F3-BE96-D9F9-67FC33ED99F6}"/>
+              </a:ext>
+            </a:extLst>
+          </p:cNvPr>
+          <p:cNvCxnSpPr>
+            <a:cxnSpLocks/>
+          </p:cNvCxnSpPr>
+          <p:nvPr/>
+        </p:nvCxnSpPr>
+        <p:spPr>
+          <a:xfrm>
+            <a:off x="6519848" y="3492887"/>
+            <a:ext cx="2526831" cy="1261"/>
+          </a:xfrm>
+          <a:prstGeom prst="line">
+            <a:avLst/>
+          </a:prstGeom>
+        </p:spPr>
+        <p:style>
+          <a:lnRef idx="3">
+            <a:schemeClr val="accent3"/>
+          </a:lnRef>
+          <a:fillRef idx="0">
+            <a:schemeClr val="accent3"/>
+          </a:fillRef>
+          <a:effectRef idx="2">
+            <a:schemeClr val="accent3"/>
+          </a:effectRef>
+          <a:fontRef idx="minor">
+            <a:schemeClr val="tx1"/>
+          </a:fontRef>
+        </p:style>
+      </p:cxnSp>
+      <p:cxnSp>
+        <p:nvCxnSpPr>
+          <p:cNvPr id="57" name="직선 연결선[R] 56">
+            <a:extLst>
+              <a:ext uri="{FF2B5EF4-FFF2-40B4-BE49-F238E27FC236}">
+                <a16:creationId xmlns:a16="http://schemas.microsoft.com/office/drawing/2014/main" id="{B99129FB-3F24-5D69-EDE6-AD1718FAAAEA}"/>
+              </a:ext>
+            </a:extLst>
+          </p:cNvPr>
+          <p:cNvCxnSpPr>
+            <a:cxnSpLocks/>
+          </p:cNvCxnSpPr>
+          <p:nvPr/>
+        </p:nvCxnSpPr>
+        <p:spPr>
+          <a:xfrm>
+            <a:off x="6526820" y="5829921"/>
+            <a:ext cx="2526831" cy="1261"/>
+          </a:xfrm>
+          <a:prstGeom prst="line">
+            <a:avLst/>
+          </a:prstGeom>
+        </p:spPr>
+        <p:style>
+          <a:lnRef idx="3">
+            <a:schemeClr val="accent3"/>
+          </a:lnRef>
+          <a:fillRef idx="0">
+            <a:schemeClr val="accent3"/>
+          </a:fillRef>
+          <a:effectRef idx="2">
+            <a:schemeClr val="accent3"/>
+          </a:effectRef>
+          <a:fontRef idx="minor">
+            <a:schemeClr val="tx1"/>
+          </a:fontRef>
+        </p:style>
+      </p:cxnSp>
+      <p:sp>
+        <p:nvSpPr>
+          <p:cNvPr id="58" name="TextBox 57">
+            <a:extLst>
+              <a:ext uri="{FF2B5EF4-FFF2-40B4-BE49-F238E27FC236}">
+                <a16:creationId xmlns:a16="http://schemas.microsoft.com/office/drawing/2014/main" id="{9B74D9EE-FC2D-0C88-9C8B-F5A92942E0F8}"/>
+              </a:ext>
+            </a:extLst>
+          </p:cNvPr>
+          <p:cNvSpPr txBox="1"/>
+          <p:nvPr/>
+        </p:nvSpPr>
+        <p:spPr>
+          <a:xfrm>
+            <a:off x="7408431" y="5968419"/>
+            <a:ext cx="751487" cy="738664"/>
+          </a:xfrm>
+          <a:prstGeom prst="rect">
+            <a:avLst/>
+          </a:prstGeom>
+        </p:spPr>
+        <p:style>
+          <a:lnRef idx="2">
+            <a:schemeClr val="accent5"/>
+          </a:lnRef>
+          <a:fillRef idx="1">
+            <a:schemeClr val="lt1"/>
+          </a:fillRef>
+          <a:effectRef idx="0">
+            <a:schemeClr val="accent5"/>
+          </a:effectRef>
+          <a:fontRef idx="minor">
+            <a:schemeClr val="dk1"/>
+          </a:fontRef>
+        </p:style>
+        <p:txBody>
+          <a:bodyPr wrap="square" rtlCol="0">
+            <a:spAutoFit/>
+          </a:bodyPr>
+          <a:lstStyle/>
+          <a:p>
+            <a:pPr algn="ctr"/>
+            <a:r>
+              <a:rPr kumimoji="1" lang="en-US" altLang="ko-KR" sz="1400" dirty="0"/>
+              <a:t>.</a:t>
+            </a:r>
+          </a:p>
+          <a:p>
+            <a:pPr algn="ctr"/>
+            <a:r>
+              <a:rPr kumimoji="1" lang="en-US" altLang="ko-KR" sz="1400" dirty="0"/>
+              <a:t>.</a:t>
+            </a:r>
+          </a:p>
+          <a:p>
+            <a:pPr algn="ctr"/>
+            <a:r>
+              <a:rPr kumimoji="1" lang="en-US" altLang="ko-KR" sz="1400" dirty="0"/>
+              <a:t>.</a:t>
+            </a:r>
+            <a:endParaRPr kumimoji="1" lang="ko-Kore-KR" altLang="en-US" sz="1400" dirty="0"/>
+          </a:p>
+        </p:txBody>
+      </p:sp>
+      <p:cxnSp>
+        <p:nvCxnSpPr>
+          <p:cNvPr id="59" name="직선 연결선[R] 58">
+            <a:extLst>
+              <a:ext uri="{FF2B5EF4-FFF2-40B4-BE49-F238E27FC236}">
+                <a16:creationId xmlns:a16="http://schemas.microsoft.com/office/drawing/2014/main" id="{31F84CB7-0594-1F39-CC7F-E151EB1CB7E9}"/>
+              </a:ext>
+            </a:extLst>
+          </p:cNvPr>
+          <p:cNvCxnSpPr>
+            <a:cxnSpLocks/>
+          </p:cNvCxnSpPr>
+          <p:nvPr/>
+        </p:nvCxnSpPr>
+        <p:spPr>
+          <a:xfrm>
+            <a:off x="1089082" y="6464546"/>
+            <a:ext cx="2526831" cy="1261"/>
+          </a:xfrm>
+          <a:prstGeom prst="line">
+            <a:avLst/>
+          </a:prstGeom>
+        </p:spPr>
+        <p:style>
+          <a:lnRef idx="3">
+            <a:schemeClr val="accent3"/>
+          </a:lnRef>
+          <a:fillRef idx="0">
+            <a:schemeClr val="accent3"/>
+          </a:fillRef>
+          <a:effectRef idx="2">
+            <a:schemeClr val="accent3"/>
+          </a:effectRef>
+          <a:fontRef idx="minor">
+            <a:schemeClr val="tx1"/>
+          </a:fontRef>
+        </p:style>
+      </p:cxnSp>
+      <p:sp>
+        <p:nvSpPr>
+          <p:cNvPr id="60" name="TextBox 59">
+            <a:extLst>
+              <a:ext uri="{FF2B5EF4-FFF2-40B4-BE49-F238E27FC236}">
+                <a16:creationId xmlns:a16="http://schemas.microsoft.com/office/drawing/2014/main" id="{647E67C7-F15B-D9B2-357D-2E9E6BCD81E1}"/>
+              </a:ext>
+            </a:extLst>
+          </p:cNvPr>
+          <p:cNvSpPr txBox="1"/>
+          <p:nvPr/>
+        </p:nvSpPr>
+        <p:spPr>
+          <a:xfrm>
+            <a:off x="3660790" y="184429"/>
+            <a:ext cx="2438897" cy="369332"/>
+          </a:xfrm>
+          <a:prstGeom prst="rect">
+            <a:avLst/>
+          </a:prstGeom>
+          <a:ln>
+            <a:solidFill>
+              <a:srgbClr val="FF00A8"/>
+            </a:solidFill>
+          </a:ln>
+        </p:spPr>
+        <p:style>
+          <a:lnRef idx="2">
+            <a:schemeClr val="accent3"/>
+          </a:lnRef>
+          <a:fillRef idx="1">
+            <a:schemeClr val="lt1"/>
+          </a:fillRef>
+          <a:effectRef idx="0">
+            <a:schemeClr val="accent3"/>
+          </a:effectRef>
+          <a:fontRef idx="minor">
+            <a:schemeClr val="dk1"/>
+          </a:fontRef>
+        </p:style>
+        <p:txBody>
+          <a:bodyPr wrap="square" rtlCol="0">
+            <a:spAutoFit/>
+          </a:bodyPr>
+          <a:lstStyle/>
+          <a:p>
+            <a:pPr algn="ctr"/>
+            <a:r>
+              <a:rPr kumimoji="1" lang="en-US" altLang="ko-Kore-KR" dirty="0"/>
+              <a:t>Connection-Oriented</a:t>
+            </a:r>
+            <a:endParaRPr kumimoji="1" lang="ko-Kore-KR" altLang="en-US" dirty="0"/>
+          </a:p>
+        </p:txBody>
+      </p:sp>
+      <p:cxnSp>
+        <p:nvCxnSpPr>
+          <p:cNvPr id="61" name="직선 화살표 연결선 60">
+            <a:extLst>
+              <a:ext uri="{FF2B5EF4-FFF2-40B4-BE49-F238E27FC236}">
+                <a16:creationId xmlns:a16="http://schemas.microsoft.com/office/drawing/2014/main" id="{C398E670-D2E9-05F9-CE3E-B79C04D71EA0}"/>
+              </a:ext>
+            </a:extLst>
+          </p:cNvPr>
+          <p:cNvCxnSpPr>
+            <a:cxnSpLocks/>
+            <a:stCxn id="60" idx="1"/>
+            <a:endCxn id="2" idx="3"/>
+          </p:cNvCxnSpPr>
+          <p:nvPr/>
+        </p:nvCxnSpPr>
+        <p:spPr>
+          <a:xfrm flipH="1">
+            <a:off x="3270335" y="369095"/>
+            <a:ext cx="390455" cy="0"/>
+          </a:xfrm>
+          <a:prstGeom prst="straightConnector1">
+            <a:avLst/>
+          </a:prstGeom>
+          <a:ln>
+            <a:solidFill>
+              <a:srgbClr val="FF00A8"/>
+            </a:solidFill>
+            <a:tailEnd type="triangle"/>
+          </a:ln>
+        </p:spPr>
+        <p:style>
+          <a:lnRef idx="3">
+            <a:schemeClr val="accent1"/>
+          </a:lnRef>
+          <a:fillRef idx="0">
+            <a:schemeClr val="accent1"/>
+          </a:fillRef>
+          <a:effectRef idx="2">
+            <a:schemeClr val="accent1"/>
+          </a:effectRef>
+          <a:fontRef idx="minor">
+            <a:schemeClr val="tx1"/>
+          </a:fontRef>
+        </p:style>
+      </p:cxnSp>
+      <p:cxnSp>
+        <p:nvCxnSpPr>
+          <p:cNvPr id="64" name="직선 화살표 연결선 63">
+            <a:extLst>
+              <a:ext uri="{FF2B5EF4-FFF2-40B4-BE49-F238E27FC236}">
+                <a16:creationId xmlns:a16="http://schemas.microsoft.com/office/drawing/2014/main" id="{04A2C2D8-1D96-2765-1589-FE8148729826}"/>
+              </a:ext>
+            </a:extLst>
+          </p:cNvPr>
+          <p:cNvCxnSpPr>
+            <a:cxnSpLocks/>
+            <a:stCxn id="60" idx="3"/>
+            <a:endCxn id="25" idx="1"/>
+          </p:cNvCxnSpPr>
+          <p:nvPr/>
+        </p:nvCxnSpPr>
+        <p:spPr>
+          <a:xfrm>
+            <a:off x="6099687" y="369095"/>
+            <a:ext cx="395609" cy="0"/>
+          </a:xfrm>
+          <a:prstGeom prst="straightConnector1">
+            <a:avLst/>
+          </a:prstGeom>
+          <a:ln>
+            <a:solidFill>
+              <a:srgbClr val="FF00A8"/>
+            </a:solidFill>
+            <a:tailEnd type="triangle"/>
+          </a:ln>
+        </p:spPr>
+        <p:style>
+          <a:lnRef idx="3">
+            <a:schemeClr val="accent1"/>
+          </a:lnRef>
+          <a:fillRef idx="0">
+            <a:schemeClr val="accent1"/>
+          </a:fillRef>
+          <a:effectRef idx="2">
+            <a:schemeClr val="accent1"/>
+          </a:effectRef>
+          <a:fontRef idx="minor">
+            <a:schemeClr val="tx1"/>
+          </a:fontRef>
+        </p:style>
+      </p:cxnSp>
+      <p:sp>
+        <p:nvSpPr>
+          <p:cNvPr id="69" name="타원 68">
+            <a:extLst>
+              <a:ext uri="{FF2B5EF4-FFF2-40B4-BE49-F238E27FC236}">
+                <a16:creationId xmlns:a16="http://schemas.microsoft.com/office/drawing/2014/main" id="{27AC6487-987A-0226-A69B-A0CA42419269}"/>
+              </a:ext>
+            </a:extLst>
+          </p:cNvPr>
+          <p:cNvSpPr/>
+          <p:nvPr/>
+        </p:nvSpPr>
+        <p:spPr>
+          <a:xfrm>
+            <a:off x="6361385" y="1259826"/>
+            <a:ext cx="2877204" cy="2211063"/>
+          </a:xfrm>
+          <a:prstGeom prst="ellipse">
+            <a:avLst/>
+          </a:prstGeom>
+          <a:noFill/>
+          <a:ln>
+            <a:solidFill>
+              <a:srgbClr val="FF00A8"/>
+            </a:solidFill>
+          </a:ln>
+        </p:spPr>
+        <p:style>
+          <a:lnRef idx="2">
+            <a:schemeClr val="accent1">
+              <a:shade val="50000"/>
+            </a:schemeClr>
+          </a:lnRef>
+          <a:fillRef idx="1">
+            <a:schemeClr val="accent1"/>
+          </a:fillRef>
+          <a:effectRef idx="0">
+            <a:schemeClr val="accent1"/>
+          </a:effectRef>
+          <a:fontRef idx="minor">
+            <a:schemeClr val="lt1"/>
+          </a:fontRef>
+        </p:style>
+        <p:txBody>
+          <a:bodyPr rtlCol="0" anchor="ctr"/>
+          <a:lstStyle/>
+          <a:p>
+            <a:pPr algn="ctr"/>
+            <a:endParaRPr kumimoji="1" lang="ko-Kore-KR" altLang="en-US"/>
+          </a:p>
+        </p:txBody>
+      </p:sp>
+      <p:sp>
+        <p:nvSpPr>
+          <p:cNvPr id="70" name="타원 69">
+            <a:extLst>
+              <a:ext uri="{FF2B5EF4-FFF2-40B4-BE49-F238E27FC236}">
+                <a16:creationId xmlns:a16="http://schemas.microsoft.com/office/drawing/2014/main" id="{2486CD6D-EB04-A747-865D-73AECBE4AA40}"/>
+              </a:ext>
+            </a:extLst>
+          </p:cNvPr>
+          <p:cNvSpPr/>
+          <p:nvPr/>
+        </p:nvSpPr>
+        <p:spPr>
+          <a:xfrm>
+            <a:off x="6361385" y="3654803"/>
+            <a:ext cx="2877204" cy="2211063"/>
+          </a:xfrm>
+          <a:prstGeom prst="ellipse">
+            <a:avLst/>
+          </a:prstGeom>
+          <a:noFill/>
+          <a:ln>
+            <a:solidFill>
+              <a:srgbClr val="FF00A8"/>
+            </a:solidFill>
+          </a:ln>
+        </p:spPr>
+        <p:style>
+          <a:lnRef idx="2">
+            <a:schemeClr val="accent1">
+              <a:shade val="50000"/>
+            </a:schemeClr>
+          </a:lnRef>
+          <a:fillRef idx="1">
+            <a:schemeClr val="accent1"/>
+          </a:fillRef>
+          <a:effectRef idx="0">
+            <a:schemeClr val="accent1"/>
+          </a:effectRef>
+          <a:fontRef idx="minor">
+            <a:schemeClr val="lt1"/>
+          </a:fontRef>
+        </p:style>
+        <p:txBody>
+          <a:bodyPr rtlCol="0" anchor="ctr"/>
+          <a:lstStyle/>
+          <a:p>
+            <a:pPr algn="ctr"/>
+            <a:endParaRPr kumimoji="1" lang="ko-Kore-KR" altLang="en-US"/>
+          </a:p>
+        </p:txBody>
+      </p:sp>
     </p:spTree>
     <p:extLst>
       <p:ext uri="{BB962C8B-B14F-4D97-AF65-F5344CB8AC3E}">
@@ -13306,6 +15658,240 @@
               <a:t>app-client</a:t>
             </a:r>
             <a:endParaRPr kumimoji="1" lang="ko-Kore-KR" altLang="en-US" dirty="0"/>
+          </a:p>
+        </p:txBody>
+      </p:sp>
+      <p:cxnSp>
+        <p:nvCxnSpPr>
+          <p:cNvPr id="26" name="직선 화살표 연결선 25">
+            <a:extLst>
+              <a:ext uri="{FF2B5EF4-FFF2-40B4-BE49-F238E27FC236}">
+                <a16:creationId xmlns:a16="http://schemas.microsoft.com/office/drawing/2014/main" id="{19DDD635-027D-6E6D-B92B-2077CE4F5369}"/>
+              </a:ext>
+            </a:extLst>
+          </p:cNvPr>
+          <p:cNvCxnSpPr/>
+          <p:nvPr/>
+        </p:nvCxnSpPr>
+        <p:spPr>
+          <a:xfrm>
+            <a:off x="9605689" y="1266496"/>
+            <a:ext cx="0" cy="793531"/>
+          </a:xfrm>
+          <a:prstGeom prst="straightConnector1">
+            <a:avLst/>
+          </a:prstGeom>
+          <a:ln>
+            <a:tailEnd type="triangle"/>
+          </a:ln>
+        </p:spPr>
+        <p:style>
+          <a:lnRef idx="3">
+            <a:schemeClr val="accent1"/>
+          </a:lnRef>
+          <a:fillRef idx="0">
+            <a:schemeClr val="accent1"/>
+          </a:fillRef>
+          <a:effectRef idx="2">
+            <a:schemeClr val="accent1"/>
+          </a:effectRef>
+          <a:fontRef idx="minor">
+            <a:schemeClr val="tx1"/>
+          </a:fontRef>
+        </p:style>
+      </p:cxnSp>
+      <p:cxnSp>
+        <p:nvCxnSpPr>
+          <p:cNvPr id="27" name="직선 화살표 연결선 26">
+            <a:extLst>
+              <a:ext uri="{FF2B5EF4-FFF2-40B4-BE49-F238E27FC236}">
+                <a16:creationId xmlns:a16="http://schemas.microsoft.com/office/drawing/2014/main" id="{7D72165C-8AF1-BF95-89B7-E2EF0D4B7190}"/>
+              </a:ext>
+            </a:extLst>
+          </p:cNvPr>
+          <p:cNvCxnSpPr>
+            <a:cxnSpLocks/>
+          </p:cNvCxnSpPr>
+          <p:nvPr/>
+        </p:nvCxnSpPr>
+        <p:spPr>
+          <a:xfrm flipV="1">
+            <a:off x="9494561" y="4219903"/>
+            <a:ext cx="0" cy="641131"/>
+          </a:xfrm>
+          <a:prstGeom prst="straightConnector1">
+            <a:avLst/>
+          </a:prstGeom>
+          <a:ln>
+            <a:tailEnd type="triangle"/>
+          </a:ln>
+        </p:spPr>
+        <p:style>
+          <a:lnRef idx="3">
+            <a:schemeClr val="accent1"/>
+          </a:lnRef>
+          <a:fillRef idx="0">
+            <a:schemeClr val="accent1"/>
+          </a:fillRef>
+          <a:effectRef idx="2">
+            <a:schemeClr val="accent1"/>
+          </a:effectRef>
+          <a:fontRef idx="minor">
+            <a:schemeClr val="tx1"/>
+          </a:fontRef>
+        </p:style>
+      </p:cxnSp>
+      <p:sp>
+        <p:nvSpPr>
+          <p:cNvPr id="28" name="다이아몬드 27">
+            <a:extLst>
+              <a:ext uri="{FF2B5EF4-FFF2-40B4-BE49-F238E27FC236}">
+                <a16:creationId xmlns:a16="http://schemas.microsoft.com/office/drawing/2014/main" id="{E9E97D94-28AA-9FBD-5413-E0A17DCF2D31}"/>
+              </a:ext>
+            </a:extLst>
+          </p:cNvPr>
+          <p:cNvSpPr/>
+          <p:nvPr/>
+        </p:nvSpPr>
+        <p:spPr>
+          <a:xfrm>
+            <a:off x="9484820" y="1282261"/>
+            <a:ext cx="241738" cy="241738"/>
+          </a:xfrm>
+          <a:prstGeom prst="diamond">
+            <a:avLst/>
+          </a:prstGeom>
+        </p:spPr>
+        <p:style>
+          <a:lnRef idx="2">
+            <a:schemeClr val="accent1">
+              <a:shade val="50000"/>
+            </a:schemeClr>
+          </a:lnRef>
+          <a:fillRef idx="1">
+            <a:schemeClr val="accent1"/>
+          </a:fillRef>
+          <a:effectRef idx="0">
+            <a:schemeClr val="accent1"/>
+          </a:effectRef>
+          <a:fontRef idx="minor">
+            <a:schemeClr val="lt1"/>
+          </a:fontRef>
+        </p:style>
+        <p:txBody>
+          <a:bodyPr rtlCol="0" anchor="ctr"/>
+          <a:lstStyle/>
+          <a:p>
+            <a:pPr algn="ctr"/>
+            <a:endParaRPr kumimoji="1" lang="ko-Kore-KR" altLang="en-US"/>
+          </a:p>
+        </p:txBody>
+      </p:sp>
+      <p:sp>
+        <p:nvSpPr>
+          <p:cNvPr id="29" name="다이아몬드 28">
+            <a:extLst>
+              <a:ext uri="{FF2B5EF4-FFF2-40B4-BE49-F238E27FC236}">
+                <a16:creationId xmlns:a16="http://schemas.microsoft.com/office/drawing/2014/main" id="{81EDA827-C2D6-A370-B01D-3A8E18EC720E}"/>
+              </a:ext>
+            </a:extLst>
+          </p:cNvPr>
+          <p:cNvSpPr/>
+          <p:nvPr/>
+        </p:nvSpPr>
+        <p:spPr>
+          <a:xfrm>
+            <a:off x="9373692" y="4619296"/>
+            <a:ext cx="241738" cy="241738"/>
+          </a:xfrm>
+          <a:prstGeom prst="diamond">
+            <a:avLst/>
+          </a:prstGeom>
+        </p:spPr>
+        <p:style>
+          <a:lnRef idx="2">
+            <a:schemeClr val="accent1">
+              <a:shade val="50000"/>
+            </a:schemeClr>
+          </a:lnRef>
+          <a:fillRef idx="1">
+            <a:schemeClr val="accent1"/>
+          </a:fillRef>
+          <a:effectRef idx="0">
+            <a:schemeClr val="accent1"/>
+          </a:effectRef>
+          <a:fontRef idx="minor">
+            <a:schemeClr val="lt1"/>
+          </a:fontRef>
+        </p:style>
+        <p:txBody>
+          <a:bodyPr rtlCol="0" anchor="ctr"/>
+          <a:lstStyle/>
+          <a:p>
+            <a:pPr algn="ctr"/>
+            <a:endParaRPr kumimoji="1" lang="ko-Kore-KR" altLang="en-US"/>
+          </a:p>
+        </p:txBody>
+      </p:sp>
+      <p:sp>
+        <p:nvSpPr>
+          <p:cNvPr id="30" name="TextBox 29">
+            <a:extLst>
+              <a:ext uri="{FF2B5EF4-FFF2-40B4-BE49-F238E27FC236}">
+                <a16:creationId xmlns:a16="http://schemas.microsoft.com/office/drawing/2014/main" id="{8CC8EAE7-0AE4-F7CC-1160-F6BD00796766}"/>
+              </a:ext>
+            </a:extLst>
+          </p:cNvPr>
+          <p:cNvSpPr txBox="1"/>
+          <p:nvPr/>
+        </p:nvSpPr>
+        <p:spPr>
+          <a:xfrm>
+            <a:off x="6192454" y="1062334"/>
+            <a:ext cx="2154621" cy="923330"/>
+          </a:xfrm>
+          <a:prstGeom prst="rect">
+            <a:avLst/>
+          </a:prstGeom>
+        </p:spPr>
+        <p:style>
+          <a:lnRef idx="2">
+            <a:schemeClr val="dk1"/>
+          </a:lnRef>
+          <a:fillRef idx="1">
+            <a:schemeClr val="lt1"/>
+          </a:fillRef>
+          <a:effectRef idx="0">
+            <a:schemeClr val="dk1"/>
+          </a:effectRef>
+          <a:fontRef idx="minor">
+            <a:schemeClr val="dk1"/>
+          </a:fontRef>
+        </p:style>
+        <p:txBody>
+          <a:bodyPr wrap="square" rtlCol="0">
+            <a:spAutoFit/>
+          </a:bodyPr>
+          <a:lstStyle/>
+          <a:p>
+            <a:r>
+              <a:rPr kumimoji="1" lang="ko-Kore-KR" altLang="en-US" dirty="0"/>
+              <a:t>서버</a:t>
+            </a:r>
+            <a:r>
+              <a:rPr kumimoji="1" lang="ko-KR" altLang="en-US" dirty="0"/>
+              <a:t> 개발자가</a:t>
+            </a:r>
+            <a:endParaRPr kumimoji="1" lang="en-US" altLang="ko-KR" dirty="0"/>
+          </a:p>
+          <a:p>
+            <a:r>
+              <a:rPr kumimoji="1" lang="en-US" altLang="ko-KR" dirty="0"/>
+              <a:t>import</a:t>
+            </a:r>
+          </a:p>
+          <a:p>
+            <a:endParaRPr kumimoji="1" lang="en-US" altLang="ko-Kore-KR" dirty="0"/>
           </a:p>
         </p:txBody>
       </p:sp>

</xml_diff>

<commit_message>
Make Request Thread class in board-app-servar pkg
</commit_message>
<xml_diff>
--- a/study-note/자바/2022-08-19 내용정리.pptx
+++ b/study-note/자바/2022-08-19 내용정리.pptx
@@ -212,7 +212,7 @@
           <a:p>
             <a:fld id="{F526C2EA-361D-406E-8534-6CB21787882E}" type="datetimeFigureOut">
               <a:rPr lang="ko-KR" altLang="en-US" smtClean="0"/>
-              <a:t>2022. 8. 20.</a:t>
+              <a:t>2022. 8. 22.</a:t>
             </a:fld>
             <a:endParaRPr lang="ko-KR" altLang="en-US"/>
           </a:p>
@@ -626,7 +626,7 @@
           <a:p>
             <a:fld id="{E429DD96-549C-4464-A555-B392FBD40474}" type="datetimeFigureOut">
               <a:rPr lang="ko-KR" altLang="en-US" smtClean="0"/>
-              <a:t>2022. 8. 20.</a:t>
+              <a:t>2022. 8. 22.</a:t>
             </a:fld>
             <a:endParaRPr lang="ko-KR" altLang="en-US"/>
           </a:p>
@@ -824,7 +824,7 @@
           <a:p>
             <a:fld id="{E429DD96-549C-4464-A555-B392FBD40474}" type="datetimeFigureOut">
               <a:rPr lang="ko-KR" altLang="en-US" smtClean="0"/>
-              <a:t>2022. 8. 20.</a:t>
+              <a:t>2022. 8. 22.</a:t>
             </a:fld>
             <a:endParaRPr lang="ko-KR" altLang="en-US"/>
           </a:p>
@@ -1032,7 +1032,7 @@
           <a:p>
             <a:fld id="{E429DD96-549C-4464-A555-B392FBD40474}" type="datetimeFigureOut">
               <a:rPr lang="ko-KR" altLang="en-US" smtClean="0"/>
-              <a:t>2022. 8. 20.</a:t>
+              <a:t>2022. 8. 22.</a:t>
             </a:fld>
             <a:endParaRPr lang="ko-KR" altLang="en-US"/>
           </a:p>
@@ -1230,7 +1230,7 @@
           <a:p>
             <a:fld id="{E429DD96-549C-4464-A555-B392FBD40474}" type="datetimeFigureOut">
               <a:rPr lang="ko-KR" altLang="en-US" smtClean="0"/>
-              <a:t>2022. 8. 20.</a:t>
+              <a:t>2022. 8. 22.</a:t>
             </a:fld>
             <a:endParaRPr lang="ko-KR" altLang="en-US"/>
           </a:p>
@@ -1505,7 +1505,7 @@
           <a:p>
             <a:fld id="{E429DD96-549C-4464-A555-B392FBD40474}" type="datetimeFigureOut">
               <a:rPr lang="ko-KR" altLang="en-US" smtClean="0"/>
-              <a:t>2022. 8. 20.</a:t>
+              <a:t>2022. 8. 22.</a:t>
             </a:fld>
             <a:endParaRPr lang="ko-KR" altLang="en-US"/>
           </a:p>
@@ -1770,7 +1770,7 @@
           <a:p>
             <a:fld id="{E429DD96-549C-4464-A555-B392FBD40474}" type="datetimeFigureOut">
               <a:rPr lang="ko-KR" altLang="en-US" smtClean="0"/>
-              <a:t>2022. 8. 20.</a:t>
+              <a:t>2022. 8. 22.</a:t>
             </a:fld>
             <a:endParaRPr lang="ko-KR" altLang="en-US"/>
           </a:p>
@@ -2182,7 +2182,7 @@
           <a:p>
             <a:fld id="{E429DD96-549C-4464-A555-B392FBD40474}" type="datetimeFigureOut">
               <a:rPr lang="ko-KR" altLang="en-US" smtClean="0"/>
-              <a:t>2022. 8. 20.</a:t>
+              <a:t>2022. 8. 22.</a:t>
             </a:fld>
             <a:endParaRPr lang="ko-KR" altLang="en-US"/>
           </a:p>
@@ -2323,7 +2323,7 @@
           <a:p>
             <a:fld id="{E429DD96-549C-4464-A555-B392FBD40474}" type="datetimeFigureOut">
               <a:rPr lang="ko-KR" altLang="en-US" smtClean="0"/>
-              <a:t>2022. 8. 20.</a:t>
+              <a:t>2022. 8. 22.</a:t>
             </a:fld>
             <a:endParaRPr lang="ko-KR" altLang="en-US"/>
           </a:p>
@@ -2436,7 +2436,7 @@
           <a:p>
             <a:fld id="{E429DD96-549C-4464-A555-B392FBD40474}" type="datetimeFigureOut">
               <a:rPr lang="ko-KR" altLang="en-US" smtClean="0"/>
-              <a:t>2022. 8. 20.</a:t>
+              <a:t>2022. 8. 22.</a:t>
             </a:fld>
             <a:endParaRPr lang="ko-KR" altLang="en-US"/>
           </a:p>
@@ -2747,7 +2747,7 @@
           <a:p>
             <a:fld id="{E429DD96-549C-4464-A555-B392FBD40474}" type="datetimeFigureOut">
               <a:rPr lang="ko-KR" altLang="en-US" smtClean="0"/>
-              <a:t>2022. 8. 20.</a:t>
+              <a:t>2022. 8. 22.</a:t>
             </a:fld>
             <a:endParaRPr lang="ko-KR" altLang="en-US"/>
           </a:p>
@@ -3035,7 +3035,7 @@
           <a:p>
             <a:fld id="{E429DD96-549C-4464-A555-B392FBD40474}" type="datetimeFigureOut">
               <a:rPr lang="ko-KR" altLang="en-US" smtClean="0"/>
-              <a:t>2022. 8. 20.</a:t>
+              <a:t>2022. 8. 22.</a:t>
             </a:fld>
             <a:endParaRPr lang="ko-KR" altLang="en-US"/>
           </a:p>
@@ -3276,7 +3276,7 @@
           <a:p>
             <a:fld id="{E429DD96-549C-4464-A555-B392FBD40474}" type="datetimeFigureOut">
               <a:rPr lang="ko-KR" altLang="en-US" smtClean="0"/>
-              <a:t>2022. 8. 20.</a:t>
+              <a:t>2022. 8. 22.</a:t>
             </a:fld>
             <a:endParaRPr lang="ko-KR" altLang="en-US"/>
           </a:p>
@@ -20911,7 +20911,7 @@
         </p:nvSpPr>
         <p:spPr>
           <a:xfrm>
-            <a:off x="1229710" y="1639614"/>
+            <a:off x="0" y="80991"/>
             <a:ext cx="1713187" cy="893379"/>
           </a:xfrm>
           <a:prstGeom prst="rect">
@@ -20961,7 +20961,7 @@
         </p:nvSpPr>
         <p:spPr>
           <a:xfrm>
-            <a:off x="1229710" y="3967655"/>
+            <a:off x="0" y="4108331"/>
             <a:ext cx="1713187" cy="893379"/>
           </a:xfrm>
           <a:prstGeom prst="rect">
@@ -21011,7 +21011,7 @@
         </p:nvSpPr>
         <p:spPr>
           <a:xfrm>
-            <a:off x="2291255" y="2785241"/>
+            <a:off x="1236038" y="1434416"/>
             <a:ext cx="2154621" cy="923330"/>
           </a:xfrm>
           <a:prstGeom prst="rect">
@@ -21093,7 +21093,7 @@
         </p:nvSpPr>
         <p:spPr>
           <a:xfrm>
-            <a:off x="2086303" y="5218386"/>
+            <a:off x="856593" y="5359062"/>
             <a:ext cx="2154621" cy="923330"/>
           </a:xfrm>
           <a:prstGeom prst="rect">
@@ -21179,9 +21179,9 @@
           <p:nvPr/>
         </p:nvCxnSpPr>
         <p:spPr>
-          <a:xfrm flipV="1">
-            <a:off x="4445876" y="2532993"/>
-            <a:ext cx="4312961" cy="713913"/>
+          <a:xfrm>
+            <a:off x="3390659" y="1896081"/>
+            <a:ext cx="4138468" cy="777588"/>
           </a:xfrm>
           <a:prstGeom prst="straightConnector1">
             <a:avLst/>
@@ -21226,7 +21226,7 @@
         </p:nvCxnSpPr>
         <p:spPr>
           <a:xfrm flipV="1">
-            <a:off x="4240924" y="2532993"/>
+            <a:off x="3011214" y="2673669"/>
             <a:ext cx="4517913" cy="3147058"/>
           </a:xfrm>
           <a:prstGeom prst="straightConnector1">
@@ -21268,7 +21268,7 @@
         </p:nvSpPr>
         <p:spPr>
           <a:xfrm>
-            <a:off x="8758837" y="2086303"/>
+            <a:off x="7529127" y="2226979"/>
             <a:ext cx="1713187" cy="893379"/>
           </a:xfrm>
           <a:prstGeom prst="rect">
@@ -21318,7 +21318,7 @@
         </p:nvSpPr>
         <p:spPr>
           <a:xfrm>
-            <a:off x="4821949" y="3180848"/>
+            <a:off x="3513477" y="2660732"/>
             <a:ext cx="2954940" cy="646331"/>
           </a:xfrm>
           <a:prstGeom prst="rect">
@@ -21380,7 +21380,7 @@
         </p:nvSpPr>
         <p:spPr>
           <a:xfrm>
-            <a:off x="8758837" y="3416654"/>
+            <a:off x="9478796" y="2350502"/>
             <a:ext cx="2154621" cy="646331"/>
           </a:xfrm>
           <a:prstGeom prst="rect">
@@ -21452,7 +21452,7 @@
         </p:nvSpPr>
         <p:spPr>
           <a:xfrm>
-            <a:off x="8778322" y="388882"/>
+            <a:off x="7529127" y="143894"/>
             <a:ext cx="1713187" cy="893379"/>
           </a:xfrm>
           <a:prstGeom prst="rect">
@@ -21502,7 +21502,7 @@
         </p:nvSpPr>
         <p:spPr>
           <a:xfrm>
-            <a:off x="8773453" y="4861034"/>
+            <a:off x="7529127" y="5405393"/>
             <a:ext cx="1713187" cy="893379"/>
           </a:xfrm>
           <a:prstGeom prst="rect">
@@ -21547,13 +21547,16 @@
               </a:ext>
             </a:extLst>
           </p:cNvPr>
-          <p:cNvCxnSpPr/>
+          <p:cNvCxnSpPr>
+            <a:cxnSpLocks/>
+            <a:stCxn id="28" idx="0"/>
+          </p:cNvCxnSpPr>
           <p:nvPr/>
         </p:nvCxnSpPr>
         <p:spPr>
           <a:xfrm>
-            <a:off x="9605689" y="1266496"/>
-            <a:ext cx="0" cy="793531"/>
+            <a:off x="8375979" y="1037273"/>
+            <a:ext cx="0" cy="1163430"/>
           </a:xfrm>
           <a:prstGeom prst="straightConnector1">
             <a:avLst/>
@@ -21588,13 +21591,15 @@
           </p:cNvPr>
           <p:cNvCxnSpPr>
             <a:cxnSpLocks/>
+            <a:stCxn id="22" idx="0"/>
+            <a:endCxn id="11" idx="2"/>
           </p:cNvCxnSpPr>
           <p:nvPr/>
         </p:nvCxnSpPr>
         <p:spPr>
           <a:xfrm flipV="1">
-            <a:off x="9494561" y="4219903"/>
-            <a:ext cx="0" cy="641131"/>
+            <a:off x="8385721" y="3120358"/>
+            <a:ext cx="0" cy="2285035"/>
           </a:xfrm>
           <a:prstGeom prst="straightConnector1">
             <a:avLst/>
@@ -21632,7 +21637,7 @@
         </p:nvSpPr>
         <p:spPr>
           <a:xfrm>
-            <a:off x="9484820" y="1282261"/>
+            <a:off x="8255110" y="1037273"/>
             <a:ext cx="241738" cy="241738"/>
           </a:xfrm>
           <a:prstGeom prst="diamond">
@@ -21678,7 +21683,7 @@
         </p:nvSpPr>
         <p:spPr>
           <a:xfrm>
-            <a:off x="9373692" y="4619296"/>
+            <a:off x="8269337" y="5125682"/>
             <a:ext cx="241738" cy="241738"/>
           </a:xfrm>
           <a:prstGeom prst="diamond">
@@ -21724,8 +21729,8 @@
         </p:nvSpPr>
         <p:spPr>
           <a:xfrm>
-            <a:off x="6192454" y="1062334"/>
-            <a:ext cx="2154621" cy="923330"/>
+            <a:off x="5325351" y="1262687"/>
+            <a:ext cx="2154621" cy="646331"/>
           </a:xfrm>
           <a:prstGeom prst="rect">
             <a:avLst/>
@@ -21752,8 +21757,8 @@
           <a:lstStyle/>
           <a:p>
             <a:r>
-              <a:rPr kumimoji="1" lang="ko-Kore-KR" altLang="en-US" dirty="0"/>
-              <a:t>서버</a:t>
+              <a:rPr kumimoji="1" lang="en-US" altLang="ko-Kore-KR" dirty="0"/>
+              <a:t>Server</a:t>
             </a:r>
             <a:r>
               <a:rPr kumimoji="1" lang="ko-KR" altLang="en-US" dirty="0"/>
@@ -21767,8 +21772,64 @@
               <a:t>import</a:t>
             </a:r>
           </a:p>
-          <a:p>
-            <a:endParaRPr kumimoji="1" lang="en-US" altLang="ko-Kore-KR" dirty="0"/>
+        </p:txBody>
+      </p:sp>
+      <p:sp>
+        <p:nvSpPr>
+          <p:cNvPr id="17" name="TextBox 16">
+            <a:extLst>
+              <a:ext uri="{FF2B5EF4-FFF2-40B4-BE49-F238E27FC236}">
+                <a16:creationId xmlns:a16="http://schemas.microsoft.com/office/drawing/2014/main" id="{4793F494-4B56-3657-19C0-59FDFF297295}"/>
+              </a:ext>
+            </a:extLst>
+          </p:cNvPr>
+          <p:cNvSpPr txBox="1"/>
+          <p:nvPr/>
+        </p:nvSpPr>
+        <p:spPr>
+          <a:xfrm>
+            <a:off x="5582087" y="4270554"/>
+            <a:ext cx="2154621" cy="646331"/>
+          </a:xfrm>
+          <a:prstGeom prst="rect">
+            <a:avLst/>
+          </a:prstGeom>
+        </p:spPr>
+        <p:style>
+          <a:lnRef idx="2">
+            <a:schemeClr val="dk1"/>
+          </a:lnRef>
+          <a:fillRef idx="1">
+            <a:schemeClr val="lt1"/>
+          </a:fillRef>
+          <a:effectRef idx="0">
+            <a:schemeClr val="dk1"/>
+          </a:effectRef>
+          <a:fontRef idx="minor">
+            <a:schemeClr val="dk1"/>
+          </a:fontRef>
+        </p:style>
+        <p:txBody>
+          <a:bodyPr wrap="square" rtlCol="0">
+            <a:spAutoFit/>
+          </a:bodyPr>
+          <a:lstStyle/>
+          <a:p>
+            <a:r>
+              <a:rPr kumimoji="1" lang="en-US" altLang="ko-KR" dirty="0"/>
+              <a:t>Client</a:t>
+            </a:r>
+            <a:r>
+              <a:rPr kumimoji="1" lang="ko-KR" altLang="en-US" dirty="0"/>
+              <a:t> 개발자가</a:t>
+            </a:r>
+            <a:endParaRPr kumimoji="1" lang="en-US" altLang="ko-KR" dirty="0"/>
+          </a:p>
+          <a:p>
+            <a:r>
+              <a:rPr kumimoji="1" lang="en-US" altLang="ko-KR" dirty="0"/>
+              <a:t>import</a:t>
+            </a:r>
           </a:p>
         </p:txBody>
       </p:sp>

</xml_diff>